<commit_message>
added sales data slide
</commit_message>
<xml_diff>
--- a/Presentation - Strawman.pptx
+++ b/Presentation - Strawman.pptx
@@ -11,13 +11,14 @@
     <p:sldId id="272" r:id="rId5"/>
     <p:sldId id="260" r:id="rId6"/>
     <p:sldId id="261" r:id="rId7"/>
-    <p:sldId id="269" r:id="rId8"/>
-    <p:sldId id="270" r:id="rId9"/>
-    <p:sldId id="262" r:id="rId10"/>
-    <p:sldId id="263" r:id="rId11"/>
-    <p:sldId id="264" r:id="rId12"/>
-    <p:sldId id="265" r:id="rId13"/>
-    <p:sldId id="266" r:id="rId14"/>
+    <p:sldId id="274" r:id="rId8"/>
+    <p:sldId id="269" r:id="rId9"/>
+    <p:sldId id="270" r:id="rId10"/>
+    <p:sldId id="262" r:id="rId11"/>
+    <p:sldId id="263" r:id="rId12"/>
+    <p:sldId id="264" r:id="rId13"/>
+    <p:sldId id="265" r:id="rId14"/>
+    <p:sldId id="266" r:id="rId15"/>
   </p:sldIdLst>
   <p:sldSz cx="12192000" cy="6858000"/>
   <p:notesSz cx="6858000" cy="9144000"/>
@@ -124,6 +125,3177 @@
 </p:presentation>
 </file>
 
+<file path=ppt/diagrams/colors1.xml><?xml version="1.0" encoding="utf-8"?>
+<dgm:colorsDef xmlns:dgm="http://schemas.openxmlformats.org/drawingml/2006/diagram" xmlns:a="http://schemas.openxmlformats.org/drawingml/2006/main" uniqueId="urn:microsoft.com/office/officeart/2005/8/colors/accent0_3">
+  <dgm:title val=""/>
+  <dgm:desc val=""/>
+  <dgm:catLst>
+    <dgm:cat type="mainScheme" pri="10300"/>
+  </dgm:catLst>
+  <dgm:styleLbl name="node0">
+    <dgm:fillClrLst meth="repeat">
+      <a:schemeClr val="dk2"/>
+    </dgm:fillClrLst>
+    <dgm:linClrLst meth="repeat">
+      <a:schemeClr val="lt2"/>
+    </dgm:linClrLst>
+    <dgm:effectClrLst/>
+    <dgm:txLinClrLst/>
+    <dgm:txFillClrLst/>
+    <dgm:txEffectClrLst/>
+  </dgm:styleLbl>
+  <dgm:styleLbl name="alignNode1">
+    <dgm:fillClrLst meth="repeat">
+      <a:schemeClr val="dk2"/>
+    </dgm:fillClrLst>
+    <dgm:linClrLst meth="repeat">
+      <a:schemeClr val="dk2"/>
+    </dgm:linClrLst>
+    <dgm:effectClrLst/>
+    <dgm:txLinClrLst/>
+    <dgm:txFillClrLst/>
+    <dgm:txEffectClrLst/>
+  </dgm:styleLbl>
+  <dgm:styleLbl name="node1">
+    <dgm:fillClrLst meth="repeat">
+      <a:schemeClr val="dk2"/>
+    </dgm:fillClrLst>
+    <dgm:linClrLst meth="repeat">
+      <a:schemeClr val="lt2"/>
+    </dgm:linClrLst>
+    <dgm:effectClrLst/>
+    <dgm:txLinClrLst/>
+    <dgm:txFillClrLst/>
+    <dgm:txEffectClrLst/>
+  </dgm:styleLbl>
+  <dgm:styleLbl name="lnNode1">
+    <dgm:fillClrLst meth="repeat">
+      <a:schemeClr val="dk2"/>
+    </dgm:fillClrLst>
+    <dgm:linClrLst meth="repeat">
+      <a:schemeClr val="lt2"/>
+    </dgm:linClrLst>
+    <dgm:effectClrLst/>
+    <dgm:txLinClrLst/>
+    <dgm:txFillClrLst/>
+    <dgm:txEffectClrLst/>
+  </dgm:styleLbl>
+  <dgm:styleLbl name="vennNode1">
+    <dgm:fillClrLst meth="repeat">
+      <a:schemeClr val="dk2">
+        <a:alpha val="50000"/>
+      </a:schemeClr>
+    </dgm:fillClrLst>
+    <dgm:linClrLst meth="repeat">
+      <a:schemeClr val="lt2"/>
+    </dgm:linClrLst>
+    <dgm:effectClrLst/>
+    <dgm:txLinClrLst/>
+    <dgm:txFillClrLst/>
+    <dgm:txEffectClrLst/>
+  </dgm:styleLbl>
+  <dgm:styleLbl name="node2">
+    <dgm:fillClrLst meth="repeat">
+      <a:schemeClr val="dk2"/>
+    </dgm:fillClrLst>
+    <dgm:linClrLst meth="repeat">
+      <a:schemeClr val="lt2"/>
+    </dgm:linClrLst>
+    <dgm:effectClrLst/>
+    <dgm:txLinClrLst/>
+    <dgm:txFillClrLst/>
+    <dgm:txEffectClrLst/>
+  </dgm:styleLbl>
+  <dgm:styleLbl name="node3">
+    <dgm:fillClrLst meth="repeat">
+      <a:schemeClr val="dk2"/>
+    </dgm:fillClrLst>
+    <dgm:linClrLst meth="repeat">
+      <a:schemeClr val="lt2"/>
+    </dgm:linClrLst>
+    <dgm:effectClrLst/>
+    <dgm:txLinClrLst/>
+    <dgm:txFillClrLst/>
+    <dgm:txEffectClrLst/>
+  </dgm:styleLbl>
+  <dgm:styleLbl name="node4">
+    <dgm:fillClrLst meth="repeat">
+      <a:schemeClr val="dk2"/>
+    </dgm:fillClrLst>
+    <dgm:linClrLst meth="repeat">
+      <a:schemeClr val="lt2"/>
+    </dgm:linClrLst>
+    <dgm:effectClrLst/>
+    <dgm:txLinClrLst/>
+    <dgm:txFillClrLst/>
+    <dgm:txEffectClrLst/>
+  </dgm:styleLbl>
+  <dgm:styleLbl name="fgImgPlace1">
+    <dgm:fillClrLst meth="repeat">
+      <a:schemeClr val="dk2">
+        <a:tint val="50000"/>
+      </a:schemeClr>
+    </dgm:fillClrLst>
+    <dgm:linClrLst meth="repeat">
+      <a:schemeClr val="lt2"/>
+    </dgm:linClrLst>
+    <dgm:effectClrLst/>
+    <dgm:txLinClrLst/>
+    <dgm:txFillClrLst meth="repeat">
+      <a:schemeClr val="lt2"/>
+    </dgm:txFillClrLst>
+    <dgm:txEffectClrLst/>
+  </dgm:styleLbl>
+  <dgm:styleLbl name="alignImgPlace1">
+    <dgm:fillClrLst meth="repeat">
+      <a:schemeClr val="dk2">
+        <a:tint val="50000"/>
+      </a:schemeClr>
+    </dgm:fillClrLst>
+    <dgm:linClrLst meth="repeat">
+      <a:schemeClr val="dk2">
+        <a:shade val="80000"/>
+      </a:schemeClr>
+    </dgm:linClrLst>
+    <dgm:effectClrLst/>
+    <dgm:txLinClrLst/>
+    <dgm:txFillClrLst meth="repeat">
+      <a:schemeClr val="lt2"/>
+    </dgm:txFillClrLst>
+    <dgm:txEffectClrLst/>
+  </dgm:styleLbl>
+  <dgm:styleLbl name="bgImgPlace1">
+    <dgm:fillClrLst meth="repeat">
+      <a:schemeClr val="dk2">
+        <a:tint val="50000"/>
+      </a:schemeClr>
+    </dgm:fillClrLst>
+    <dgm:linClrLst meth="repeat">
+      <a:schemeClr val="dk2">
+        <a:shade val="80000"/>
+      </a:schemeClr>
+    </dgm:linClrLst>
+    <dgm:effectClrLst/>
+    <dgm:txLinClrLst/>
+    <dgm:txFillClrLst meth="repeat">
+      <a:schemeClr val="lt2"/>
+    </dgm:txFillClrLst>
+    <dgm:txEffectClrLst/>
+  </dgm:styleLbl>
+  <dgm:styleLbl name="sibTrans2D1">
+    <dgm:fillClrLst meth="repeat">
+      <a:schemeClr val="dk2">
+        <a:tint val="60000"/>
+      </a:schemeClr>
+    </dgm:fillClrLst>
+    <dgm:linClrLst meth="repeat">
+      <a:schemeClr val="dk2">
+        <a:tint val="60000"/>
+      </a:schemeClr>
+    </dgm:linClrLst>
+    <dgm:effectClrLst/>
+    <dgm:txLinClrLst/>
+    <dgm:txFillClrLst/>
+    <dgm:txEffectClrLst/>
+  </dgm:styleLbl>
+  <dgm:styleLbl name="fgSibTrans2D1">
+    <dgm:fillClrLst meth="repeat">
+      <a:schemeClr val="dk2">
+        <a:tint val="60000"/>
+      </a:schemeClr>
+    </dgm:fillClrLst>
+    <dgm:linClrLst meth="repeat">
+      <a:schemeClr val="dk2">
+        <a:tint val="60000"/>
+      </a:schemeClr>
+    </dgm:linClrLst>
+    <dgm:effectClrLst/>
+    <dgm:txLinClrLst/>
+    <dgm:txFillClrLst/>
+    <dgm:txEffectClrLst/>
+  </dgm:styleLbl>
+  <dgm:styleLbl name="bgSibTrans2D1">
+    <dgm:fillClrLst meth="repeat">
+      <a:schemeClr val="dk2">
+        <a:tint val="60000"/>
+      </a:schemeClr>
+    </dgm:fillClrLst>
+    <dgm:linClrLst meth="repeat">
+      <a:schemeClr val="dk2">
+        <a:tint val="60000"/>
+      </a:schemeClr>
+    </dgm:linClrLst>
+    <dgm:effectClrLst/>
+    <dgm:txLinClrLst/>
+    <dgm:txFillClrLst/>
+    <dgm:txEffectClrLst/>
+  </dgm:styleLbl>
+  <dgm:styleLbl name="sibTrans1D1">
+    <dgm:fillClrLst meth="repeat">
+      <a:schemeClr val="dk2"/>
+    </dgm:fillClrLst>
+    <dgm:linClrLst meth="repeat">
+      <a:schemeClr val="dk2"/>
+    </dgm:linClrLst>
+    <dgm:effectClrLst/>
+    <dgm:txLinClrLst/>
+    <dgm:txFillClrLst meth="repeat">
+      <a:schemeClr val="lt2"/>
+    </dgm:txFillClrLst>
+    <dgm:txEffectClrLst/>
+  </dgm:styleLbl>
+  <dgm:styleLbl name="callout">
+    <dgm:fillClrLst meth="repeat">
+      <a:schemeClr val="dk2"/>
+    </dgm:fillClrLst>
+    <dgm:linClrLst meth="repeat">
+      <a:schemeClr val="dk2">
+        <a:tint val="50000"/>
+      </a:schemeClr>
+    </dgm:linClrLst>
+    <dgm:effectClrLst/>
+    <dgm:txLinClrLst/>
+    <dgm:txFillClrLst meth="repeat">
+      <a:schemeClr val="lt2"/>
+    </dgm:txFillClrLst>
+    <dgm:txEffectClrLst/>
+  </dgm:styleLbl>
+  <dgm:styleLbl name="asst0">
+    <dgm:fillClrLst meth="repeat">
+      <a:schemeClr val="dk2"/>
+    </dgm:fillClrLst>
+    <dgm:linClrLst meth="repeat">
+      <a:schemeClr val="lt2"/>
+    </dgm:linClrLst>
+    <dgm:effectClrLst/>
+    <dgm:txLinClrLst/>
+    <dgm:txFillClrLst/>
+    <dgm:txEffectClrLst/>
+  </dgm:styleLbl>
+  <dgm:styleLbl name="asst1">
+    <dgm:fillClrLst meth="repeat">
+      <a:schemeClr val="dk2"/>
+    </dgm:fillClrLst>
+    <dgm:linClrLst meth="repeat">
+      <a:schemeClr val="lt2"/>
+    </dgm:linClrLst>
+    <dgm:effectClrLst/>
+    <dgm:txLinClrLst/>
+    <dgm:txFillClrLst/>
+    <dgm:txEffectClrLst/>
+  </dgm:styleLbl>
+  <dgm:styleLbl name="asst2">
+    <dgm:fillClrLst meth="repeat">
+      <a:schemeClr val="dk2"/>
+    </dgm:fillClrLst>
+    <dgm:linClrLst meth="repeat">
+      <a:schemeClr val="lt2"/>
+    </dgm:linClrLst>
+    <dgm:effectClrLst/>
+    <dgm:txLinClrLst/>
+    <dgm:txFillClrLst/>
+    <dgm:txEffectClrLst/>
+  </dgm:styleLbl>
+  <dgm:styleLbl name="asst3">
+    <dgm:fillClrLst meth="repeat">
+      <a:schemeClr val="dk2"/>
+    </dgm:fillClrLst>
+    <dgm:linClrLst meth="repeat">
+      <a:schemeClr val="lt2"/>
+    </dgm:linClrLst>
+    <dgm:effectClrLst/>
+    <dgm:txLinClrLst/>
+    <dgm:txFillClrLst/>
+    <dgm:txEffectClrLst/>
+  </dgm:styleLbl>
+  <dgm:styleLbl name="asst4">
+    <dgm:fillClrLst meth="repeat">
+      <a:schemeClr val="dk2"/>
+    </dgm:fillClrLst>
+    <dgm:linClrLst meth="repeat">
+      <a:schemeClr val="lt2"/>
+    </dgm:linClrLst>
+    <dgm:effectClrLst/>
+    <dgm:txLinClrLst/>
+    <dgm:txFillClrLst/>
+    <dgm:txEffectClrLst/>
+  </dgm:styleLbl>
+  <dgm:styleLbl name="parChTrans2D1">
+    <dgm:fillClrLst meth="repeat">
+      <a:schemeClr val="dk2">
+        <a:tint val="60000"/>
+      </a:schemeClr>
+    </dgm:fillClrLst>
+    <dgm:linClrLst meth="repeat">
+      <a:schemeClr val="dk2">
+        <a:tint val="60000"/>
+      </a:schemeClr>
+    </dgm:linClrLst>
+    <dgm:effectClrLst/>
+    <dgm:txLinClrLst/>
+    <dgm:txFillClrLst meth="repeat">
+      <a:schemeClr val="lt2"/>
+    </dgm:txFillClrLst>
+    <dgm:txEffectClrLst/>
+  </dgm:styleLbl>
+  <dgm:styleLbl name="parChTrans2D2">
+    <dgm:fillClrLst meth="repeat">
+      <a:schemeClr val="dk2"/>
+    </dgm:fillClrLst>
+    <dgm:linClrLst meth="repeat">
+      <a:schemeClr val="dk2"/>
+    </dgm:linClrLst>
+    <dgm:effectClrLst/>
+    <dgm:txLinClrLst/>
+    <dgm:txFillClrLst meth="repeat">
+      <a:schemeClr val="lt2"/>
+    </dgm:txFillClrLst>
+    <dgm:txEffectClrLst/>
+  </dgm:styleLbl>
+  <dgm:styleLbl name="parChTrans2D3">
+    <dgm:fillClrLst meth="repeat">
+      <a:schemeClr val="dk2"/>
+    </dgm:fillClrLst>
+    <dgm:linClrLst meth="repeat">
+      <a:schemeClr val="dk2"/>
+    </dgm:linClrLst>
+    <dgm:effectClrLst/>
+    <dgm:txLinClrLst/>
+    <dgm:txFillClrLst meth="repeat">
+      <a:schemeClr val="lt2"/>
+    </dgm:txFillClrLst>
+    <dgm:txEffectClrLst/>
+  </dgm:styleLbl>
+  <dgm:styleLbl name="parChTrans2D4">
+    <dgm:fillClrLst meth="repeat">
+      <a:schemeClr val="dk2"/>
+    </dgm:fillClrLst>
+    <dgm:linClrLst meth="repeat">
+      <a:schemeClr val="dk2"/>
+    </dgm:linClrLst>
+    <dgm:effectClrLst/>
+    <dgm:txLinClrLst/>
+    <dgm:txFillClrLst meth="repeat">
+      <a:schemeClr val="lt2"/>
+    </dgm:txFillClrLst>
+    <dgm:txEffectClrLst/>
+  </dgm:styleLbl>
+  <dgm:styleLbl name="parChTrans1D1">
+    <dgm:fillClrLst meth="repeat">
+      <a:schemeClr val="dk2"/>
+    </dgm:fillClrLst>
+    <dgm:linClrLst meth="repeat">
+      <a:schemeClr val="dk2">
+        <a:shade val="60000"/>
+      </a:schemeClr>
+    </dgm:linClrLst>
+    <dgm:effectClrLst/>
+    <dgm:txLinClrLst/>
+    <dgm:txFillClrLst meth="repeat">
+      <a:schemeClr val="tx1"/>
+    </dgm:txFillClrLst>
+    <dgm:txEffectClrLst/>
+  </dgm:styleLbl>
+  <dgm:styleLbl name="parChTrans1D2">
+    <dgm:fillClrLst meth="repeat">
+      <a:schemeClr val="dk2"/>
+    </dgm:fillClrLst>
+    <dgm:linClrLst meth="repeat">
+      <a:schemeClr val="dk2">
+        <a:shade val="60000"/>
+      </a:schemeClr>
+    </dgm:linClrLst>
+    <dgm:effectClrLst/>
+    <dgm:txLinClrLst/>
+    <dgm:txFillClrLst meth="repeat">
+      <a:schemeClr val="tx1"/>
+    </dgm:txFillClrLst>
+    <dgm:txEffectClrLst/>
+  </dgm:styleLbl>
+  <dgm:styleLbl name="parChTrans1D3">
+    <dgm:fillClrLst meth="repeat">
+      <a:schemeClr val="dk2"/>
+    </dgm:fillClrLst>
+    <dgm:linClrLst meth="repeat">
+      <a:schemeClr val="dk2">
+        <a:shade val="80000"/>
+      </a:schemeClr>
+    </dgm:linClrLst>
+    <dgm:effectClrLst/>
+    <dgm:txLinClrLst/>
+    <dgm:txFillClrLst meth="repeat">
+      <a:schemeClr val="tx1"/>
+    </dgm:txFillClrLst>
+    <dgm:txEffectClrLst/>
+  </dgm:styleLbl>
+  <dgm:styleLbl name="parChTrans1D4">
+    <dgm:fillClrLst meth="repeat">
+      <a:schemeClr val="dk2"/>
+    </dgm:fillClrLst>
+    <dgm:linClrLst meth="repeat">
+      <a:schemeClr val="dk2">
+        <a:shade val="80000"/>
+      </a:schemeClr>
+    </dgm:linClrLst>
+    <dgm:effectClrLst/>
+    <dgm:txLinClrLst/>
+    <dgm:txFillClrLst meth="repeat">
+      <a:schemeClr val="tx1"/>
+    </dgm:txFillClrLst>
+    <dgm:txEffectClrLst/>
+  </dgm:styleLbl>
+  <dgm:styleLbl name="fgAcc1">
+    <dgm:fillClrLst meth="repeat">
+      <a:schemeClr val="lt2">
+        <a:alpha val="90000"/>
+      </a:schemeClr>
+    </dgm:fillClrLst>
+    <dgm:linClrLst meth="repeat">
+      <a:schemeClr val="dk2"/>
+    </dgm:linClrLst>
+    <dgm:effectClrLst/>
+    <dgm:txLinClrLst/>
+    <dgm:txFillClrLst meth="repeat">
+      <a:schemeClr val="dk1"/>
+    </dgm:txFillClrLst>
+    <dgm:txEffectClrLst/>
+  </dgm:styleLbl>
+  <dgm:styleLbl name="conFgAcc1">
+    <dgm:fillClrLst meth="repeat">
+      <a:schemeClr val="lt2">
+        <a:alpha val="90000"/>
+      </a:schemeClr>
+    </dgm:fillClrLst>
+    <dgm:linClrLst meth="repeat">
+      <a:schemeClr val="dk2"/>
+    </dgm:linClrLst>
+    <dgm:effectClrLst/>
+    <dgm:txLinClrLst/>
+    <dgm:txFillClrLst meth="repeat">
+      <a:schemeClr val="dk1"/>
+    </dgm:txFillClrLst>
+    <dgm:txEffectClrLst/>
+  </dgm:styleLbl>
+  <dgm:styleLbl name="alignAcc1">
+    <dgm:fillClrLst meth="repeat">
+      <a:schemeClr val="lt2">
+        <a:alpha val="90000"/>
+      </a:schemeClr>
+    </dgm:fillClrLst>
+    <dgm:linClrLst meth="repeat">
+      <a:schemeClr val="dk2"/>
+    </dgm:linClrLst>
+    <dgm:effectClrLst/>
+    <dgm:txLinClrLst/>
+    <dgm:txFillClrLst meth="repeat">
+      <a:schemeClr val="dk1"/>
+    </dgm:txFillClrLst>
+    <dgm:txEffectClrLst/>
+  </dgm:styleLbl>
+  <dgm:styleLbl name="trAlignAcc1">
+    <dgm:fillClrLst meth="repeat">
+      <a:schemeClr val="lt2">
+        <a:alpha val="40000"/>
+      </a:schemeClr>
+    </dgm:fillClrLst>
+    <dgm:linClrLst meth="repeat">
+      <a:schemeClr val="dk2"/>
+    </dgm:linClrLst>
+    <dgm:effectClrLst/>
+    <dgm:txLinClrLst/>
+    <dgm:txFillClrLst meth="repeat">
+      <a:schemeClr val="dk1"/>
+    </dgm:txFillClrLst>
+    <dgm:txEffectClrLst/>
+  </dgm:styleLbl>
+  <dgm:styleLbl name="bgAcc1">
+    <dgm:fillClrLst meth="repeat">
+      <a:schemeClr val="lt2">
+        <a:alpha val="90000"/>
+      </a:schemeClr>
+    </dgm:fillClrLst>
+    <dgm:linClrLst meth="repeat">
+      <a:schemeClr val="dk2"/>
+    </dgm:linClrLst>
+    <dgm:effectClrLst/>
+    <dgm:txLinClrLst/>
+    <dgm:txFillClrLst meth="repeat">
+      <a:schemeClr val="dk1"/>
+    </dgm:txFillClrLst>
+    <dgm:txEffectClrLst/>
+  </dgm:styleLbl>
+  <dgm:styleLbl name="solidFgAcc1">
+    <dgm:fillClrLst meth="repeat">
+      <a:schemeClr val="lt2"/>
+    </dgm:fillClrLst>
+    <dgm:linClrLst meth="repeat">
+      <a:schemeClr val="dk2"/>
+    </dgm:linClrLst>
+    <dgm:effectClrLst/>
+    <dgm:txLinClrLst/>
+    <dgm:txFillClrLst meth="repeat">
+      <a:schemeClr val="dk1"/>
+    </dgm:txFillClrLst>
+    <dgm:txEffectClrLst/>
+  </dgm:styleLbl>
+  <dgm:styleLbl name="solidAlignAcc1">
+    <dgm:fillClrLst meth="repeat">
+      <a:schemeClr val="lt2"/>
+    </dgm:fillClrLst>
+    <dgm:linClrLst meth="repeat">
+      <a:schemeClr val="dk2"/>
+    </dgm:linClrLst>
+    <dgm:effectClrLst/>
+    <dgm:txLinClrLst/>
+    <dgm:txFillClrLst meth="repeat">
+      <a:schemeClr val="dk1"/>
+    </dgm:txFillClrLst>
+    <dgm:txEffectClrLst/>
+  </dgm:styleLbl>
+  <dgm:styleLbl name="solidBgAcc1">
+    <dgm:fillClrLst meth="repeat">
+      <a:schemeClr val="lt2"/>
+    </dgm:fillClrLst>
+    <dgm:linClrLst meth="repeat">
+      <a:schemeClr val="dk2"/>
+    </dgm:linClrLst>
+    <dgm:effectClrLst/>
+    <dgm:txLinClrLst/>
+    <dgm:txFillClrLst meth="repeat">
+      <a:schemeClr val="dk1"/>
+    </dgm:txFillClrLst>
+    <dgm:txEffectClrLst/>
+  </dgm:styleLbl>
+  <dgm:styleLbl name="fgAccFollowNode1">
+    <dgm:fillClrLst meth="repeat">
+      <a:schemeClr val="dk2">
+        <a:alpha val="90000"/>
+        <a:tint val="40000"/>
+      </a:schemeClr>
+    </dgm:fillClrLst>
+    <dgm:linClrLst meth="repeat">
+      <a:schemeClr val="dk2">
+        <a:alpha val="90000"/>
+        <a:tint val="40000"/>
+      </a:schemeClr>
+    </dgm:linClrLst>
+    <dgm:effectClrLst/>
+    <dgm:txLinClrLst/>
+    <dgm:txFillClrLst meth="repeat">
+      <a:schemeClr val="dk1"/>
+    </dgm:txFillClrLst>
+    <dgm:txEffectClrLst/>
+  </dgm:styleLbl>
+  <dgm:styleLbl name="alignAccFollowNode1">
+    <dgm:fillClrLst meth="repeat">
+      <a:schemeClr val="dk2">
+        <a:alpha val="90000"/>
+        <a:tint val="40000"/>
+      </a:schemeClr>
+    </dgm:fillClrLst>
+    <dgm:linClrLst meth="repeat">
+      <a:schemeClr val="dk2">
+        <a:alpha val="90000"/>
+        <a:tint val="40000"/>
+      </a:schemeClr>
+    </dgm:linClrLst>
+    <dgm:effectClrLst/>
+    <dgm:txLinClrLst/>
+    <dgm:txFillClrLst meth="repeat">
+      <a:schemeClr val="dk1"/>
+    </dgm:txFillClrLst>
+    <dgm:txEffectClrLst/>
+  </dgm:styleLbl>
+  <dgm:styleLbl name="bgAccFollowNode1">
+    <dgm:fillClrLst meth="repeat">
+      <a:schemeClr val="dk2">
+        <a:alpha val="90000"/>
+        <a:tint val="40000"/>
+      </a:schemeClr>
+    </dgm:fillClrLst>
+    <dgm:linClrLst meth="repeat">
+      <a:schemeClr val="dk2">
+        <a:alpha val="90000"/>
+        <a:tint val="40000"/>
+      </a:schemeClr>
+    </dgm:linClrLst>
+    <dgm:effectClrLst/>
+    <dgm:txLinClrLst/>
+    <dgm:txFillClrLst meth="repeat">
+      <a:schemeClr val="dk1"/>
+    </dgm:txFillClrLst>
+    <dgm:txEffectClrLst/>
+  </dgm:styleLbl>
+  <dgm:styleLbl name="fgAcc0">
+    <dgm:fillClrLst meth="repeat">
+      <a:schemeClr val="lt2">
+        <a:alpha val="90000"/>
+      </a:schemeClr>
+    </dgm:fillClrLst>
+    <dgm:linClrLst meth="repeat">
+      <a:schemeClr val="dk2"/>
+    </dgm:linClrLst>
+    <dgm:effectClrLst/>
+    <dgm:txLinClrLst/>
+    <dgm:txFillClrLst meth="repeat">
+      <a:schemeClr val="dk1"/>
+    </dgm:txFillClrLst>
+    <dgm:txEffectClrLst/>
+  </dgm:styleLbl>
+  <dgm:styleLbl name="fgAcc2">
+    <dgm:fillClrLst meth="repeat">
+      <a:schemeClr val="lt2">
+        <a:alpha val="90000"/>
+      </a:schemeClr>
+    </dgm:fillClrLst>
+    <dgm:linClrLst meth="repeat">
+      <a:schemeClr val="dk2"/>
+    </dgm:linClrLst>
+    <dgm:effectClrLst/>
+    <dgm:txLinClrLst/>
+    <dgm:txFillClrLst meth="repeat">
+      <a:schemeClr val="dk1"/>
+    </dgm:txFillClrLst>
+    <dgm:txEffectClrLst/>
+  </dgm:styleLbl>
+  <dgm:styleLbl name="fgAcc3">
+    <dgm:fillClrLst meth="repeat">
+      <a:schemeClr val="lt2">
+        <a:alpha val="90000"/>
+      </a:schemeClr>
+    </dgm:fillClrLst>
+    <dgm:linClrLst meth="repeat">
+      <a:schemeClr val="dk2"/>
+    </dgm:linClrLst>
+    <dgm:effectClrLst/>
+    <dgm:txLinClrLst/>
+    <dgm:txFillClrLst meth="repeat">
+      <a:schemeClr val="dk1"/>
+    </dgm:txFillClrLst>
+    <dgm:txEffectClrLst/>
+  </dgm:styleLbl>
+  <dgm:styleLbl name="fgAcc4">
+    <dgm:fillClrLst meth="repeat">
+      <a:schemeClr val="lt2">
+        <a:alpha val="90000"/>
+      </a:schemeClr>
+    </dgm:fillClrLst>
+    <dgm:linClrLst meth="repeat">
+      <a:schemeClr val="dk2"/>
+    </dgm:linClrLst>
+    <dgm:effectClrLst/>
+    <dgm:txLinClrLst/>
+    <dgm:txFillClrLst meth="repeat">
+      <a:schemeClr val="dk1"/>
+    </dgm:txFillClrLst>
+    <dgm:txEffectClrLst/>
+  </dgm:styleLbl>
+  <dgm:styleLbl name="bgShp">
+    <dgm:fillClrLst meth="repeat">
+      <a:schemeClr val="dk2">
+        <a:tint val="40000"/>
+      </a:schemeClr>
+    </dgm:fillClrLst>
+    <dgm:linClrLst meth="repeat">
+      <a:schemeClr val="dk2"/>
+    </dgm:linClrLst>
+    <dgm:effectClrLst/>
+    <dgm:txLinClrLst/>
+    <dgm:txFillClrLst meth="repeat">
+      <a:schemeClr val="dk1"/>
+    </dgm:txFillClrLst>
+    <dgm:txEffectClrLst/>
+  </dgm:styleLbl>
+  <dgm:styleLbl name="dkBgShp">
+    <dgm:fillClrLst meth="repeat">
+      <a:schemeClr val="dk2">
+        <a:shade val="80000"/>
+      </a:schemeClr>
+    </dgm:fillClrLst>
+    <dgm:linClrLst meth="repeat">
+      <a:schemeClr val="dk2"/>
+    </dgm:linClrLst>
+    <dgm:effectClrLst/>
+    <dgm:txLinClrLst/>
+    <dgm:txFillClrLst meth="repeat">
+      <a:schemeClr val="lt1"/>
+    </dgm:txFillClrLst>
+    <dgm:txEffectClrLst/>
+  </dgm:styleLbl>
+  <dgm:styleLbl name="trBgShp">
+    <dgm:fillClrLst meth="repeat">
+      <a:schemeClr val="dk2">
+        <a:tint val="50000"/>
+        <a:alpha val="40000"/>
+      </a:schemeClr>
+    </dgm:fillClrLst>
+    <dgm:linClrLst meth="repeat">
+      <a:schemeClr val="dk2"/>
+    </dgm:linClrLst>
+    <dgm:effectClrLst/>
+    <dgm:txLinClrLst/>
+    <dgm:txFillClrLst meth="repeat">
+      <a:schemeClr val="lt1"/>
+    </dgm:txFillClrLst>
+    <dgm:txEffectClrLst/>
+  </dgm:styleLbl>
+  <dgm:styleLbl name="fgShp">
+    <dgm:fillClrLst meth="repeat">
+      <a:schemeClr val="dk2">
+        <a:tint val="60000"/>
+      </a:schemeClr>
+    </dgm:fillClrLst>
+    <dgm:linClrLst meth="repeat">
+      <a:schemeClr val="lt2"/>
+    </dgm:linClrLst>
+    <dgm:effectClrLst/>
+    <dgm:txLinClrLst/>
+    <dgm:txFillClrLst meth="repeat">
+      <a:schemeClr val="dk1"/>
+    </dgm:txFillClrLst>
+    <dgm:txEffectClrLst/>
+  </dgm:styleLbl>
+  <dgm:styleLbl name="revTx">
+    <dgm:fillClrLst meth="repeat">
+      <a:schemeClr val="lt2">
+        <a:alpha val="0"/>
+      </a:schemeClr>
+    </dgm:fillClrLst>
+    <dgm:linClrLst meth="repeat">
+      <a:schemeClr val="dk1">
+        <a:alpha val="0"/>
+      </a:schemeClr>
+    </dgm:linClrLst>
+    <dgm:effectClrLst/>
+    <dgm:txLinClrLst/>
+    <dgm:txFillClrLst meth="repeat">
+      <a:schemeClr val="tx1"/>
+    </dgm:txFillClrLst>
+    <dgm:txEffectClrLst/>
+  </dgm:styleLbl>
+</dgm:colorsDef>
+</file>
+
+<file path=ppt/diagrams/data1.xml><?xml version="1.0" encoding="utf-8"?>
+<dgm:dataModel xmlns:dgm="http://schemas.openxmlformats.org/drawingml/2006/diagram" xmlns:a="http://schemas.openxmlformats.org/drawingml/2006/main">
+  <dgm:ptLst>
+    <dgm:pt modelId="{57215324-4B36-4698-928B-A519AAB8B2BA}" type="doc">
+      <dgm:prSet loTypeId="urn:microsoft.com/office/officeart/2005/8/layout/StepDownProcess" loCatId="process" qsTypeId="urn:microsoft.com/office/officeart/2005/8/quickstyle/simple1" qsCatId="simple" csTypeId="urn:microsoft.com/office/officeart/2005/8/colors/accent0_3" csCatId="mainScheme" phldr="1"/>
+      <dgm:spPr/>
+      <dgm:t>
+        <a:bodyPr/>
+        <a:lstStyle/>
+        <a:p>
+          <a:endParaRPr lang="en-US"/>
+        </a:p>
+      </dgm:t>
+    </dgm:pt>
+    <dgm:pt modelId="{23FAF6AD-92AA-4B4B-94F4-B5823555B8D3}">
+      <dgm:prSet phldrT="[Text]" custT="1"/>
+      <dgm:spPr/>
+      <dgm:t>
+        <a:bodyPr/>
+        <a:lstStyle/>
+        <a:p>
+          <a:r>
+            <a:rPr lang="en-US" sz="3200" b="1" dirty="0">
+              <a:effectLst>
+                <a:outerShdw blurRad="38100" dist="38100" dir="2700000" algn="tl">
+                  <a:srgbClr val="000000">
+                    <a:alpha val="43137"/>
+                  </a:srgbClr>
+                </a:outerShdw>
+              </a:effectLst>
+              <a:latin typeface="Questrial" panose="02000000000000000000"/>
+            </a:rPr>
+            <a:t>80 </a:t>
+          </a:r>
+          <a:r>
+            <a:rPr lang="en-US" sz="3200" dirty="0">
+              <a:latin typeface="Questrial" panose="02000000000000000000"/>
+            </a:rPr>
+            <a:t>spreadsheets</a:t>
+          </a:r>
+        </a:p>
+      </dgm:t>
+    </dgm:pt>
+    <dgm:pt modelId="{AE8AE40E-81F6-434F-B844-85B5D2EE1476}" type="parTrans" cxnId="{EF4CDDDD-6F36-4986-A974-3AF35295EE45}">
+      <dgm:prSet/>
+      <dgm:spPr/>
+      <dgm:t>
+        <a:bodyPr/>
+        <a:lstStyle/>
+        <a:p>
+          <a:endParaRPr lang="en-US"/>
+        </a:p>
+      </dgm:t>
+    </dgm:pt>
+    <dgm:pt modelId="{856951FD-82D0-477E-8940-16B3B22F5698}" type="sibTrans" cxnId="{EF4CDDDD-6F36-4986-A974-3AF35295EE45}">
+      <dgm:prSet/>
+      <dgm:spPr/>
+      <dgm:t>
+        <a:bodyPr/>
+        <a:lstStyle/>
+        <a:p>
+          <a:endParaRPr lang="en-US"/>
+        </a:p>
+      </dgm:t>
+    </dgm:pt>
+    <dgm:pt modelId="{358ABF4A-FC68-43C0-AB36-BDA499C36472}">
+      <dgm:prSet phldrT="[Text]" custT="1"/>
+      <dgm:spPr/>
+      <dgm:t>
+        <a:bodyPr/>
+        <a:lstStyle/>
+        <a:p>
+          <a:pPr>
+            <a:buFontTx/>
+            <a:buNone/>
+          </a:pPr>
+          <a:r>
+            <a:rPr lang="en-US" sz="2400" dirty="0">
+              <a:solidFill>
+                <a:schemeClr val="bg1"/>
+              </a:solidFill>
+              <a:latin typeface="Questrial" panose="02000000000000000000"/>
+            </a:rPr>
+            <a:t>2003 – 2018 sales data by year and borough</a:t>
+          </a:r>
+        </a:p>
+      </dgm:t>
+    </dgm:pt>
+    <dgm:pt modelId="{3B984CCA-996B-4158-A0DF-FAF317905A9B}" type="parTrans" cxnId="{FAD44126-9496-43EC-ABA7-4AE84E2537AA}">
+      <dgm:prSet/>
+      <dgm:spPr/>
+      <dgm:t>
+        <a:bodyPr/>
+        <a:lstStyle/>
+        <a:p>
+          <a:endParaRPr lang="en-US"/>
+        </a:p>
+      </dgm:t>
+    </dgm:pt>
+    <dgm:pt modelId="{7967366A-168D-412E-9D1D-88706D3A0FD0}" type="sibTrans" cxnId="{FAD44126-9496-43EC-ABA7-4AE84E2537AA}">
+      <dgm:prSet/>
+      <dgm:spPr/>
+      <dgm:t>
+        <a:bodyPr/>
+        <a:lstStyle/>
+        <a:p>
+          <a:endParaRPr lang="en-US"/>
+        </a:p>
+      </dgm:t>
+    </dgm:pt>
+    <dgm:pt modelId="{CD4BFA8E-C797-4661-803D-E8C08148CFBA}">
+      <dgm:prSet phldrT="[Text]" custT="1"/>
+      <dgm:spPr/>
+      <dgm:t>
+        <a:bodyPr/>
+        <a:lstStyle/>
+        <a:p>
+          <a:r>
+            <a:rPr lang="en-US" sz="3200" b="1" dirty="0">
+              <a:effectLst>
+                <a:outerShdw blurRad="38100" dist="38100" dir="2700000" algn="tl">
+                  <a:srgbClr val="000000">
+                    <a:alpha val="43137"/>
+                  </a:srgbClr>
+                </a:outerShdw>
+              </a:effectLst>
+              <a:latin typeface="Questrial" panose="02000000000000000000"/>
+            </a:rPr>
+            <a:t>1</a:t>
+          </a:r>
+          <a:r>
+            <a:rPr lang="en-US" sz="3200" dirty="0">
+              <a:latin typeface="Questrial" panose="02000000000000000000"/>
+            </a:rPr>
+            <a:t> SQL database</a:t>
+          </a:r>
+        </a:p>
+      </dgm:t>
+    </dgm:pt>
+    <dgm:pt modelId="{25248325-C8D7-4080-B0A3-01C1C039D033}" type="parTrans" cxnId="{4AF18525-B594-4AD2-8D17-EFC7554F98AF}">
+      <dgm:prSet/>
+      <dgm:spPr/>
+      <dgm:t>
+        <a:bodyPr/>
+        <a:lstStyle/>
+        <a:p>
+          <a:endParaRPr lang="en-US"/>
+        </a:p>
+      </dgm:t>
+    </dgm:pt>
+    <dgm:pt modelId="{36651CF2-4017-438C-A729-97B40E8D4581}" type="sibTrans" cxnId="{4AF18525-B594-4AD2-8D17-EFC7554F98AF}">
+      <dgm:prSet/>
+      <dgm:spPr/>
+      <dgm:t>
+        <a:bodyPr/>
+        <a:lstStyle/>
+        <a:p>
+          <a:endParaRPr lang="en-US"/>
+        </a:p>
+      </dgm:t>
+    </dgm:pt>
+    <dgm:pt modelId="{15D5409B-8E41-4CF7-97D5-ADE28A891E40}">
+      <dgm:prSet phldrT="[Text]" custT="1"/>
+      <dgm:spPr/>
+      <dgm:t>
+        <a:bodyPr/>
+        <a:lstStyle/>
+        <a:p>
+          <a:pPr>
+            <a:buFontTx/>
+            <a:buNone/>
+          </a:pPr>
+          <a:r>
+            <a:rPr lang="en-US" sz="2400" dirty="0">
+              <a:solidFill>
+                <a:schemeClr val="bg1"/>
+              </a:solidFill>
+              <a:latin typeface="Questrial" panose="02000000000000000000"/>
+            </a:rPr>
+            <a:t>loaded all spreadsheets into </a:t>
+          </a:r>
+          <a:r>
+            <a:rPr lang="en-US" sz="2400" dirty="0" err="1">
+              <a:solidFill>
+                <a:schemeClr val="bg1"/>
+              </a:solidFill>
+              <a:latin typeface="Questrial" panose="02000000000000000000"/>
+            </a:rPr>
+            <a:t>pgAdmin</a:t>
+          </a:r>
+          <a:endParaRPr lang="en-US" sz="2400" dirty="0">
+            <a:solidFill>
+              <a:schemeClr val="bg1"/>
+            </a:solidFill>
+            <a:latin typeface="Questrial" panose="02000000000000000000"/>
+          </a:endParaRPr>
+        </a:p>
+      </dgm:t>
+    </dgm:pt>
+    <dgm:pt modelId="{7AA6BC19-5FF1-4EE8-994F-2CECF8A018F0}" type="parTrans" cxnId="{CA8D88C6-CD80-42D3-8086-1A52855E27FC}">
+      <dgm:prSet/>
+      <dgm:spPr/>
+      <dgm:t>
+        <a:bodyPr/>
+        <a:lstStyle/>
+        <a:p>
+          <a:endParaRPr lang="en-US"/>
+        </a:p>
+      </dgm:t>
+    </dgm:pt>
+    <dgm:pt modelId="{82DD4E70-F76D-4522-96DF-1EF1A4AE332C}" type="sibTrans" cxnId="{CA8D88C6-CD80-42D3-8086-1A52855E27FC}">
+      <dgm:prSet/>
+      <dgm:spPr/>
+      <dgm:t>
+        <a:bodyPr/>
+        <a:lstStyle/>
+        <a:p>
+          <a:endParaRPr lang="en-US"/>
+        </a:p>
+      </dgm:t>
+    </dgm:pt>
+    <dgm:pt modelId="{AC5CB9AF-6818-471B-89E9-597FCAC11DBB}">
+      <dgm:prSet phldrT="[Text]" custT="1"/>
+      <dgm:spPr/>
+      <dgm:t>
+        <a:bodyPr/>
+        <a:lstStyle/>
+        <a:p>
+          <a:r>
+            <a:rPr lang="en-US" sz="3200" b="1" dirty="0">
+              <a:effectLst>
+                <a:outerShdw blurRad="38100" dist="38100" dir="2700000" algn="tl">
+                  <a:srgbClr val="000000">
+                    <a:alpha val="43137"/>
+                  </a:srgbClr>
+                </a:outerShdw>
+              </a:effectLst>
+              <a:latin typeface="Questrial" panose="02000000000000000000"/>
+            </a:rPr>
+            <a:t>5</a:t>
+          </a:r>
+          <a:r>
+            <a:rPr lang="en-US" sz="3200" dirty="0">
+              <a:latin typeface="Questrial" panose="02000000000000000000"/>
+            </a:rPr>
+            <a:t> csv files</a:t>
+          </a:r>
+        </a:p>
+      </dgm:t>
+    </dgm:pt>
+    <dgm:pt modelId="{48646341-2CAC-48C6-B870-5918DC2A607F}" type="parTrans" cxnId="{34339AF7-1F7C-4177-B5AE-E02147A8C2D7}">
+      <dgm:prSet/>
+      <dgm:spPr/>
+      <dgm:t>
+        <a:bodyPr/>
+        <a:lstStyle/>
+        <a:p>
+          <a:endParaRPr lang="en-US"/>
+        </a:p>
+      </dgm:t>
+    </dgm:pt>
+    <dgm:pt modelId="{90D7488A-B5B2-4C51-95D5-72F0F0952BFC}" type="sibTrans" cxnId="{34339AF7-1F7C-4177-B5AE-E02147A8C2D7}">
+      <dgm:prSet/>
+      <dgm:spPr/>
+      <dgm:t>
+        <a:bodyPr/>
+        <a:lstStyle/>
+        <a:p>
+          <a:endParaRPr lang="en-US"/>
+        </a:p>
+      </dgm:t>
+    </dgm:pt>
+    <dgm:pt modelId="{B04BE6B5-3481-430E-AA08-ECA9F4C6FB9A}">
+      <dgm:prSet phldrT="[Text]" custT="1"/>
+      <dgm:spPr/>
+      <dgm:t>
+        <a:bodyPr/>
+        <a:lstStyle/>
+        <a:p>
+          <a:pPr algn="l">
+            <a:buFontTx/>
+            <a:buNone/>
+          </a:pPr>
+          <a:r>
+            <a:rPr lang="en-US" sz="2400" dirty="0">
+              <a:solidFill>
+                <a:schemeClr val="bg1"/>
+              </a:solidFill>
+              <a:latin typeface="Questrial" panose="02000000000000000000"/>
+            </a:rPr>
+            <a:t>export data by borough</a:t>
+          </a:r>
+        </a:p>
+      </dgm:t>
+    </dgm:pt>
+    <dgm:pt modelId="{FFAC3A82-5CC1-4CE5-A2A4-71A59A320D59}" type="parTrans" cxnId="{B2166A3B-B17A-4D96-818A-EB49E698E8D1}">
+      <dgm:prSet/>
+      <dgm:spPr/>
+      <dgm:t>
+        <a:bodyPr/>
+        <a:lstStyle/>
+        <a:p>
+          <a:endParaRPr lang="en-US"/>
+        </a:p>
+      </dgm:t>
+    </dgm:pt>
+    <dgm:pt modelId="{48C5D5C7-8EEC-4C63-8037-FFD535BF0CBE}" type="sibTrans" cxnId="{B2166A3B-B17A-4D96-818A-EB49E698E8D1}">
+      <dgm:prSet/>
+      <dgm:spPr/>
+      <dgm:t>
+        <a:bodyPr/>
+        <a:lstStyle/>
+        <a:p>
+          <a:endParaRPr lang="en-US"/>
+        </a:p>
+      </dgm:t>
+    </dgm:pt>
+    <dgm:pt modelId="{AA8399F3-B393-42C5-93C2-24AAED05767E}" type="pres">
+      <dgm:prSet presAssocID="{57215324-4B36-4698-928B-A519AAB8B2BA}" presName="rootnode" presStyleCnt="0">
+        <dgm:presLayoutVars>
+          <dgm:chMax/>
+          <dgm:chPref/>
+          <dgm:dir/>
+          <dgm:animLvl val="lvl"/>
+        </dgm:presLayoutVars>
+      </dgm:prSet>
+      <dgm:spPr/>
+    </dgm:pt>
+    <dgm:pt modelId="{1296E01F-BE85-42FE-A703-5F1B45D5F0C2}" type="pres">
+      <dgm:prSet presAssocID="{23FAF6AD-92AA-4B4B-94F4-B5823555B8D3}" presName="composite" presStyleCnt="0"/>
+      <dgm:spPr/>
+    </dgm:pt>
+    <dgm:pt modelId="{EF1439CA-CDE0-45DB-8D3D-F1704EAC71C2}" type="pres">
+      <dgm:prSet presAssocID="{23FAF6AD-92AA-4B4B-94F4-B5823555B8D3}" presName="bentUpArrow1" presStyleLbl="alignImgPlace1" presStyleIdx="0" presStyleCnt="2"/>
+      <dgm:spPr/>
+    </dgm:pt>
+    <dgm:pt modelId="{5E81B5D2-B089-4B78-9EB8-5432B35A7A8E}" type="pres">
+      <dgm:prSet presAssocID="{23FAF6AD-92AA-4B4B-94F4-B5823555B8D3}" presName="ParentText" presStyleLbl="node1" presStyleIdx="0" presStyleCnt="3" custScaleX="160833" custLinFactNeighborX="-52988" custLinFactNeighborY="-1882">
+        <dgm:presLayoutVars>
+          <dgm:chMax val="1"/>
+          <dgm:chPref val="1"/>
+          <dgm:bulletEnabled val="1"/>
+        </dgm:presLayoutVars>
+      </dgm:prSet>
+      <dgm:spPr/>
+    </dgm:pt>
+    <dgm:pt modelId="{AECF62EF-64C5-4DBD-B200-BCE68A395269}" type="pres">
+      <dgm:prSet presAssocID="{23FAF6AD-92AA-4B4B-94F4-B5823555B8D3}" presName="ChildText" presStyleLbl="revTx" presStyleIdx="0" presStyleCnt="3" custScaleX="229631" custLinFactNeighborX="68568" custLinFactNeighborY="-8695">
+        <dgm:presLayoutVars>
+          <dgm:chMax val="0"/>
+          <dgm:chPref val="0"/>
+          <dgm:bulletEnabled val="1"/>
+        </dgm:presLayoutVars>
+      </dgm:prSet>
+      <dgm:spPr/>
+    </dgm:pt>
+    <dgm:pt modelId="{E3E56ED7-6E7B-419A-80C7-0CB753D6BD19}" type="pres">
+      <dgm:prSet presAssocID="{856951FD-82D0-477E-8940-16B3B22F5698}" presName="sibTrans" presStyleCnt="0"/>
+      <dgm:spPr/>
+    </dgm:pt>
+    <dgm:pt modelId="{543E5286-F93E-4038-9BA9-D50E0D42B152}" type="pres">
+      <dgm:prSet presAssocID="{CD4BFA8E-C797-4661-803D-E8C08148CFBA}" presName="composite" presStyleCnt="0"/>
+      <dgm:spPr/>
+    </dgm:pt>
+    <dgm:pt modelId="{1D229A78-2F52-4E53-95D9-1CE10743129F}" type="pres">
+      <dgm:prSet presAssocID="{CD4BFA8E-C797-4661-803D-E8C08148CFBA}" presName="bentUpArrow1" presStyleLbl="alignImgPlace1" presStyleIdx="1" presStyleCnt="2"/>
+      <dgm:spPr/>
+    </dgm:pt>
+    <dgm:pt modelId="{D62DD6A4-A238-4782-8FED-F742C3E33E47}" type="pres">
+      <dgm:prSet presAssocID="{CD4BFA8E-C797-4661-803D-E8C08148CFBA}" presName="ParentText" presStyleLbl="node1" presStyleIdx="1" presStyleCnt="3" custScaleX="156902" custScaleY="91045" custLinFactNeighborX="-6375" custLinFactNeighborY="-4249">
+        <dgm:presLayoutVars>
+          <dgm:chMax val="1"/>
+          <dgm:chPref val="1"/>
+          <dgm:bulletEnabled val="1"/>
+        </dgm:presLayoutVars>
+      </dgm:prSet>
+      <dgm:spPr/>
+    </dgm:pt>
+    <dgm:pt modelId="{D982D841-0F4E-4194-BA6E-8265C0EE41E6}" type="pres">
+      <dgm:prSet presAssocID="{CD4BFA8E-C797-4661-803D-E8C08148CFBA}" presName="ChildText" presStyleLbl="revTx" presStyleIdx="1" presStyleCnt="3" custScaleX="226403" custLinFactX="5696" custLinFactNeighborX="100000" custLinFactNeighborY="-11518">
+        <dgm:presLayoutVars>
+          <dgm:chMax val="0"/>
+          <dgm:chPref val="0"/>
+          <dgm:bulletEnabled val="1"/>
+        </dgm:presLayoutVars>
+      </dgm:prSet>
+      <dgm:spPr/>
+    </dgm:pt>
+    <dgm:pt modelId="{7FBB80D3-CB2F-4068-AE1C-D10413D2C637}" type="pres">
+      <dgm:prSet presAssocID="{36651CF2-4017-438C-A729-97B40E8D4581}" presName="sibTrans" presStyleCnt="0"/>
+      <dgm:spPr/>
+    </dgm:pt>
+    <dgm:pt modelId="{BC54DACF-26BC-4D5E-99D4-88DDEA6A9005}" type="pres">
+      <dgm:prSet presAssocID="{AC5CB9AF-6818-471B-89E9-597FCAC11DBB}" presName="composite" presStyleCnt="0"/>
+      <dgm:spPr/>
+    </dgm:pt>
+    <dgm:pt modelId="{5B9741FF-6FA9-4FBF-AF78-BD8E8D06D574}" type="pres">
+      <dgm:prSet presAssocID="{AC5CB9AF-6818-471B-89E9-597FCAC11DBB}" presName="ParentText" presStyleLbl="node1" presStyleIdx="2" presStyleCnt="3" custScaleX="147670" custScaleY="87204" custLinFactNeighborX="-4080" custLinFactNeighborY="-11077">
+        <dgm:presLayoutVars>
+          <dgm:chMax val="1"/>
+          <dgm:chPref val="1"/>
+          <dgm:bulletEnabled val="1"/>
+        </dgm:presLayoutVars>
+      </dgm:prSet>
+      <dgm:spPr/>
+    </dgm:pt>
+    <dgm:pt modelId="{39A2C4B4-D988-4263-902A-FDBB1806567C}" type="pres">
+      <dgm:prSet presAssocID="{AC5CB9AF-6818-471B-89E9-597FCAC11DBB}" presName="FinalChildText" presStyleLbl="revTx" presStyleIdx="2" presStyleCnt="3" custScaleX="104785" custLinFactNeighborX="31263" custLinFactNeighborY="-11443">
+        <dgm:presLayoutVars>
+          <dgm:chMax val="0"/>
+          <dgm:chPref val="0"/>
+          <dgm:bulletEnabled val="1"/>
+        </dgm:presLayoutVars>
+      </dgm:prSet>
+      <dgm:spPr/>
+    </dgm:pt>
+  </dgm:ptLst>
+  <dgm:cxnLst>
+    <dgm:cxn modelId="{A0A76F0E-D656-49DD-8E35-BCF2BEE7C1F4}" type="presOf" srcId="{358ABF4A-FC68-43C0-AB36-BDA499C36472}" destId="{AECF62EF-64C5-4DBD-B200-BCE68A395269}" srcOrd="0" destOrd="0" presId="urn:microsoft.com/office/officeart/2005/8/layout/StepDownProcess"/>
+    <dgm:cxn modelId="{4AF18525-B594-4AD2-8D17-EFC7554F98AF}" srcId="{57215324-4B36-4698-928B-A519AAB8B2BA}" destId="{CD4BFA8E-C797-4661-803D-E8C08148CFBA}" srcOrd="1" destOrd="0" parTransId="{25248325-C8D7-4080-B0A3-01C1C039D033}" sibTransId="{36651CF2-4017-438C-A729-97B40E8D4581}"/>
+    <dgm:cxn modelId="{FAD44126-9496-43EC-ABA7-4AE84E2537AA}" srcId="{23FAF6AD-92AA-4B4B-94F4-B5823555B8D3}" destId="{358ABF4A-FC68-43C0-AB36-BDA499C36472}" srcOrd="0" destOrd="0" parTransId="{3B984CCA-996B-4158-A0DF-FAF317905A9B}" sibTransId="{7967366A-168D-412E-9D1D-88706D3A0FD0}"/>
+    <dgm:cxn modelId="{3D476630-9267-4A97-98DE-784B7CEA4AB6}" type="presOf" srcId="{57215324-4B36-4698-928B-A519AAB8B2BA}" destId="{AA8399F3-B393-42C5-93C2-24AAED05767E}" srcOrd="0" destOrd="0" presId="urn:microsoft.com/office/officeart/2005/8/layout/StepDownProcess"/>
+    <dgm:cxn modelId="{B2166A3B-B17A-4D96-818A-EB49E698E8D1}" srcId="{AC5CB9AF-6818-471B-89E9-597FCAC11DBB}" destId="{B04BE6B5-3481-430E-AA08-ECA9F4C6FB9A}" srcOrd="0" destOrd="0" parTransId="{FFAC3A82-5CC1-4CE5-A2A4-71A59A320D59}" sibTransId="{48C5D5C7-8EEC-4C63-8037-FFD535BF0CBE}"/>
+    <dgm:cxn modelId="{C6D89C45-3534-4AC8-A104-4D818B3C0A44}" type="presOf" srcId="{CD4BFA8E-C797-4661-803D-E8C08148CFBA}" destId="{D62DD6A4-A238-4782-8FED-F742C3E33E47}" srcOrd="0" destOrd="0" presId="urn:microsoft.com/office/officeart/2005/8/layout/StepDownProcess"/>
+    <dgm:cxn modelId="{5613D88A-01CE-44D2-9D3F-6A40CA2DA851}" type="presOf" srcId="{23FAF6AD-92AA-4B4B-94F4-B5823555B8D3}" destId="{5E81B5D2-B089-4B78-9EB8-5432B35A7A8E}" srcOrd="0" destOrd="0" presId="urn:microsoft.com/office/officeart/2005/8/layout/StepDownProcess"/>
+    <dgm:cxn modelId="{0F924AB5-987F-455F-917D-3F0774B524C1}" type="presOf" srcId="{B04BE6B5-3481-430E-AA08-ECA9F4C6FB9A}" destId="{39A2C4B4-D988-4263-902A-FDBB1806567C}" srcOrd="0" destOrd="0" presId="urn:microsoft.com/office/officeart/2005/8/layout/StepDownProcess"/>
+    <dgm:cxn modelId="{6713E4BD-75AD-44E2-BB1C-EA97769F2EB1}" type="presOf" srcId="{15D5409B-8E41-4CF7-97D5-ADE28A891E40}" destId="{D982D841-0F4E-4194-BA6E-8265C0EE41E6}" srcOrd="0" destOrd="0" presId="urn:microsoft.com/office/officeart/2005/8/layout/StepDownProcess"/>
+    <dgm:cxn modelId="{CA8D88C6-CD80-42D3-8086-1A52855E27FC}" srcId="{CD4BFA8E-C797-4661-803D-E8C08148CFBA}" destId="{15D5409B-8E41-4CF7-97D5-ADE28A891E40}" srcOrd="0" destOrd="0" parTransId="{7AA6BC19-5FF1-4EE8-994F-2CECF8A018F0}" sibTransId="{82DD4E70-F76D-4522-96DF-1EF1A4AE332C}"/>
+    <dgm:cxn modelId="{EF4CDDDD-6F36-4986-A974-3AF35295EE45}" srcId="{57215324-4B36-4698-928B-A519AAB8B2BA}" destId="{23FAF6AD-92AA-4B4B-94F4-B5823555B8D3}" srcOrd="0" destOrd="0" parTransId="{AE8AE40E-81F6-434F-B844-85B5D2EE1476}" sibTransId="{856951FD-82D0-477E-8940-16B3B22F5698}"/>
+    <dgm:cxn modelId="{CDA6AFF4-AEB2-48F8-9AE7-C252264B2C9B}" type="presOf" srcId="{AC5CB9AF-6818-471B-89E9-597FCAC11DBB}" destId="{5B9741FF-6FA9-4FBF-AF78-BD8E8D06D574}" srcOrd="0" destOrd="0" presId="urn:microsoft.com/office/officeart/2005/8/layout/StepDownProcess"/>
+    <dgm:cxn modelId="{34339AF7-1F7C-4177-B5AE-E02147A8C2D7}" srcId="{57215324-4B36-4698-928B-A519AAB8B2BA}" destId="{AC5CB9AF-6818-471B-89E9-597FCAC11DBB}" srcOrd="2" destOrd="0" parTransId="{48646341-2CAC-48C6-B870-5918DC2A607F}" sibTransId="{90D7488A-B5B2-4C51-95D5-72F0F0952BFC}"/>
+    <dgm:cxn modelId="{1B0854A3-76A0-4552-8A4A-594D304FDE32}" type="presParOf" srcId="{AA8399F3-B393-42C5-93C2-24AAED05767E}" destId="{1296E01F-BE85-42FE-A703-5F1B45D5F0C2}" srcOrd="0" destOrd="0" presId="urn:microsoft.com/office/officeart/2005/8/layout/StepDownProcess"/>
+    <dgm:cxn modelId="{9A91720E-D920-4D5C-B2F0-560E7CCE2850}" type="presParOf" srcId="{1296E01F-BE85-42FE-A703-5F1B45D5F0C2}" destId="{EF1439CA-CDE0-45DB-8D3D-F1704EAC71C2}" srcOrd="0" destOrd="0" presId="urn:microsoft.com/office/officeart/2005/8/layout/StepDownProcess"/>
+    <dgm:cxn modelId="{518AE0F3-D489-4FA5-BD3B-FCD72C89340C}" type="presParOf" srcId="{1296E01F-BE85-42FE-A703-5F1B45D5F0C2}" destId="{5E81B5D2-B089-4B78-9EB8-5432B35A7A8E}" srcOrd="1" destOrd="0" presId="urn:microsoft.com/office/officeart/2005/8/layout/StepDownProcess"/>
+    <dgm:cxn modelId="{48B193C4-345A-4115-BA95-8D0738B04BA6}" type="presParOf" srcId="{1296E01F-BE85-42FE-A703-5F1B45D5F0C2}" destId="{AECF62EF-64C5-4DBD-B200-BCE68A395269}" srcOrd="2" destOrd="0" presId="urn:microsoft.com/office/officeart/2005/8/layout/StepDownProcess"/>
+    <dgm:cxn modelId="{A97BFF57-3507-4AFE-B485-B4E8C62669C0}" type="presParOf" srcId="{AA8399F3-B393-42C5-93C2-24AAED05767E}" destId="{E3E56ED7-6E7B-419A-80C7-0CB753D6BD19}" srcOrd="1" destOrd="0" presId="urn:microsoft.com/office/officeart/2005/8/layout/StepDownProcess"/>
+    <dgm:cxn modelId="{235E3469-0950-4F42-9117-AC7DD3EDCBC0}" type="presParOf" srcId="{AA8399F3-B393-42C5-93C2-24AAED05767E}" destId="{543E5286-F93E-4038-9BA9-D50E0D42B152}" srcOrd="2" destOrd="0" presId="urn:microsoft.com/office/officeart/2005/8/layout/StepDownProcess"/>
+    <dgm:cxn modelId="{6BC2C6D7-2A0F-41DB-BD15-1C3B6653A910}" type="presParOf" srcId="{543E5286-F93E-4038-9BA9-D50E0D42B152}" destId="{1D229A78-2F52-4E53-95D9-1CE10743129F}" srcOrd="0" destOrd="0" presId="urn:microsoft.com/office/officeart/2005/8/layout/StepDownProcess"/>
+    <dgm:cxn modelId="{F66E6F9D-C164-43C6-9DF0-6911A69844E4}" type="presParOf" srcId="{543E5286-F93E-4038-9BA9-D50E0D42B152}" destId="{D62DD6A4-A238-4782-8FED-F742C3E33E47}" srcOrd="1" destOrd="0" presId="urn:microsoft.com/office/officeart/2005/8/layout/StepDownProcess"/>
+    <dgm:cxn modelId="{595BBF49-FCEE-461E-BF60-C5A16D5088FA}" type="presParOf" srcId="{543E5286-F93E-4038-9BA9-D50E0D42B152}" destId="{D982D841-0F4E-4194-BA6E-8265C0EE41E6}" srcOrd="2" destOrd="0" presId="urn:microsoft.com/office/officeart/2005/8/layout/StepDownProcess"/>
+    <dgm:cxn modelId="{5AEE544E-F42E-4F2B-8290-4F1CD3BA0726}" type="presParOf" srcId="{AA8399F3-B393-42C5-93C2-24AAED05767E}" destId="{7FBB80D3-CB2F-4068-AE1C-D10413D2C637}" srcOrd="3" destOrd="0" presId="urn:microsoft.com/office/officeart/2005/8/layout/StepDownProcess"/>
+    <dgm:cxn modelId="{865EACF7-73C0-43EB-BC92-FF248EF4A844}" type="presParOf" srcId="{AA8399F3-B393-42C5-93C2-24AAED05767E}" destId="{BC54DACF-26BC-4D5E-99D4-88DDEA6A9005}" srcOrd="4" destOrd="0" presId="urn:microsoft.com/office/officeart/2005/8/layout/StepDownProcess"/>
+    <dgm:cxn modelId="{D89C7C47-53BA-459B-90F3-03223B97FD74}" type="presParOf" srcId="{BC54DACF-26BC-4D5E-99D4-88DDEA6A9005}" destId="{5B9741FF-6FA9-4FBF-AF78-BD8E8D06D574}" srcOrd="0" destOrd="0" presId="urn:microsoft.com/office/officeart/2005/8/layout/StepDownProcess"/>
+    <dgm:cxn modelId="{69C2324B-2659-4C19-A29E-85A7452A7061}" type="presParOf" srcId="{BC54DACF-26BC-4D5E-99D4-88DDEA6A9005}" destId="{39A2C4B4-D988-4263-902A-FDBB1806567C}" srcOrd="1" destOrd="0" presId="urn:microsoft.com/office/officeart/2005/8/layout/StepDownProcess"/>
+  </dgm:cxnLst>
+  <dgm:bg/>
+  <dgm:whole/>
+  <dgm:extLst>
+    <a:ext uri="http://schemas.microsoft.com/office/drawing/2008/diagram">
+      <dsp:dataModelExt xmlns:dsp="http://schemas.microsoft.com/office/drawing/2008/diagram" relId="rId6" minVer="http://schemas.openxmlformats.org/drawingml/2006/diagram"/>
+    </a:ext>
+  </dgm:extLst>
+</dgm:dataModel>
+</file>
+
+<file path=ppt/diagrams/drawing1.xml><?xml version="1.0" encoding="utf-8"?>
+<dsp:drawing xmlns:dgm="http://schemas.openxmlformats.org/drawingml/2006/diagram" xmlns:dsp="http://schemas.microsoft.com/office/drawing/2008/diagram" xmlns:a="http://schemas.openxmlformats.org/drawingml/2006/main">
+  <dsp:spTree>
+    <dsp:nvGrpSpPr>
+      <dsp:cNvPr id="0" name=""/>
+      <dsp:cNvGrpSpPr/>
+    </dsp:nvGrpSpPr>
+    <dsp:grpSpPr/>
+    <dsp:sp modelId="{EF1439CA-CDE0-45DB-8D3D-F1704EAC71C2}">
+      <dsp:nvSpPr>
+        <dsp:cNvPr id="0" name=""/>
+        <dsp:cNvSpPr/>
+      </dsp:nvSpPr>
+      <dsp:spPr>
+        <a:xfrm rot="5400000">
+          <a:off x="1691828" y="1480811"/>
+          <a:ext cx="1312930" cy="1494724"/>
+        </a:xfrm>
+        <a:prstGeom prst="bentUpArrow">
+          <a:avLst>
+            <a:gd name="adj1" fmla="val 32840"/>
+            <a:gd name="adj2" fmla="val 25000"/>
+            <a:gd name="adj3" fmla="val 35780"/>
+          </a:avLst>
+        </a:prstGeom>
+        <a:solidFill>
+          <a:schemeClr val="dk2">
+            <a:tint val="50000"/>
+            <a:hueOff val="0"/>
+            <a:satOff val="0"/>
+            <a:lumOff val="0"/>
+            <a:alphaOff val="0"/>
+          </a:schemeClr>
+        </a:solidFill>
+        <a:ln w="19050" cap="rnd" cmpd="sng" algn="ctr">
+          <a:solidFill>
+            <a:schemeClr val="dk2">
+              <a:shade val="80000"/>
+              <a:hueOff val="0"/>
+              <a:satOff val="0"/>
+              <a:lumOff val="0"/>
+              <a:alphaOff val="0"/>
+            </a:schemeClr>
+          </a:solidFill>
+          <a:prstDash val="solid"/>
+        </a:ln>
+        <a:effectLst/>
+      </dsp:spPr>
+      <dsp:style>
+        <a:lnRef idx="2">
+          <a:scrgbClr r="0" g="0" b="0"/>
+        </a:lnRef>
+        <a:fillRef idx="1">
+          <a:scrgbClr r="0" g="0" b="0"/>
+        </a:fillRef>
+        <a:effectRef idx="0">
+          <a:scrgbClr r="0" g="0" b="0"/>
+        </a:effectRef>
+        <a:fontRef idx="minor"/>
+      </dsp:style>
+    </dsp:sp>
+    <dsp:sp modelId="{5E81B5D2-B089-4B78-9EB8-5432B35A7A8E}">
+      <dsp:nvSpPr>
+        <dsp:cNvPr id="0" name=""/>
+        <dsp:cNvSpPr/>
+      </dsp:nvSpPr>
+      <dsp:spPr>
+        <a:xfrm>
+          <a:off x="0" y="0"/>
+          <a:ext cx="3554733" cy="1547069"/>
+        </a:xfrm>
+        <a:prstGeom prst="roundRect">
+          <a:avLst>
+            <a:gd name="adj" fmla="val 16670"/>
+          </a:avLst>
+        </a:prstGeom>
+        <a:solidFill>
+          <a:schemeClr val="dk2">
+            <a:hueOff val="0"/>
+            <a:satOff val="0"/>
+            <a:lumOff val="0"/>
+            <a:alphaOff val="0"/>
+          </a:schemeClr>
+        </a:solidFill>
+        <a:ln w="19050" cap="rnd" cmpd="sng" algn="ctr">
+          <a:solidFill>
+            <a:schemeClr val="lt2">
+              <a:hueOff val="0"/>
+              <a:satOff val="0"/>
+              <a:lumOff val="0"/>
+              <a:alphaOff val="0"/>
+            </a:schemeClr>
+          </a:solidFill>
+          <a:prstDash val="solid"/>
+        </a:ln>
+        <a:effectLst/>
+      </dsp:spPr>
+      <dsp:style>
+        <a:lnRef idx="2">
+          <a:scrgbClr r="0" g="0" b="0"/>
+        </a:lnRef>
+        <a:fillRef idx="1">
+          <a:scrgbClr r="0" g="0" b="0"/>
+        </a:fillRef>
+        <a:effectRef idx="0">
+          <a:scrgbClr r="0" g="0" b="0"/>
+        </a:effectRef>
+        <a:fontRef idx="minor">
+          <a:schemeClr val="lt1"/>
+        </a:fontRef>
+      </dsp:style>
+      <dsp:txBody>
+        <a:bodyPr spcFirstLastPara="0" vert="horz" wrap="square" lIns="121920" tIns="121920" rIns="121920" bIns="121920" numCol="1" spcCol="1270" anchor="ctr" anchorCtr="0">
+          <a:noAutofit/>
+        </a:bodyPr>
+        <a:lstStyle/>
+        <a:p>
+          <a:pPr marL="0" lvl="0" indent="0" algn="ctr" defTabSz="1422400">
+            <a:lnSpc>
+              <a:spcPct val="90000"/>
+            </a:lnSpc>
+            <a:spcBef>
+              <a:spcPct val="0"/>
+            </a:spcBef>
+            <a:spcAft>
+              <a:spcPct val="35000"/>
+            </a:spcAft>
+            <a:buNone/>
+          </a:pPr>
+          <a:r>
+            <a:rPr lang="en-US" sz="3200" b="1" kern="1200" dirty="0">
+              <a:effectLst>
+                <a:outerShdw blurRad="38100" dist="38100" dir="2700000" algn="tl">
+                  <a:srgbClr val="000000">
+                    <a:alpha val="43137"/>
+                  </a:srgbClr>
+                </a:outerShdw>
+              </a:effectLst>
+              <a:latin typeface="Questrial" panose="02000000000000000000"/>
+            </a:rPr>
+            <a:t>80 </a:t>
+          </a:r>
+          <a:r>
+            <a:rPr lang="en-US" sz="3200" kern="1200" dirty="0">
+              <a:latin typeface="Questrial" panose="02000000000000000000"/>
+            </a:rPr>
+            <a:t>spreadsheets</a:t>
+          </a:r>
+        </a:p>
+      </dsp:txBody>
+      <dsp:txXfrm>
+        <a:off x="75535" y="75535"/>
+        <a:ext cx="3403663" cy="1395999"/>
+      </dsp:txXfrm>
+    </dsp:sp>
+    <dsp:sp modelId="{AECF62EF-64C5-4DBD-B200-BCE68A395269}">
+      <dsp:nvSpPr>
+        <dsp:cNvPr id="0" name=""/>
+        <dsp:cNvSpPr/>
+      </dsp:nvSpPr>
+      <dsp:spPr>
+        <a:xfrm>
+          <a:off x="3614504" y="64227"/>
+          <a:ext cx="3691294" cy="1250409"/>
+        </a:xfrm>
+        <a:prstGeom prst="rect">
+          <a:avLst/>
+        </a:prstGeom>
+        <a:noFill/>
+        <a:ln>
+          <a:noFill/>
+        </a:ln>
+        <a:effectLst/>
+      </dsp:spPr>
+      <dsp:style>
+        <a:lnRef idx="0">
+          <a:scrgbClr r="0" g="0" b="0"/>
+        </a:lnRef>
+        <a:fillRef idx="0">
+          <a:scrgbClr r="0" g="0" b="0"/>
+        </a:fillRef>
+        <a:effectRef idx="0">
+          <a:scrgbClr r="0" g="0" b="0"/>
+        </a:effectRef>
+        <a:fontRef idx="minor"/>
+      </dsp:style>
+      <dsp:txBody>
+        <a:bodyPr spcFirstLastPara="0" vert="horz" wrap="square" lIns="91440" tIns="91440" rIns="91440" bIns="91440" numCol="1" spcCol="1270" anchor="ctr" anchorCtr="0">
+          <a:noAutofit/>
+        </a:bodyPr>
+        <a:lstStyle/>
+        <a:p>
+          <a:pPr marL="228600" lvl="1" indent="-228600" algn="l" defTabSz="1066800">
+            <a:lnSpc>
+              <a:spcPct val="90000"/>
+            </a:lnSpc>
+            <a:spcBef>
+              <a:spcPct val="0"/>
+            </a:spcBef>
+            <a:spcAft>
+              <a:spcPct val="15000"/>
+            </a:spcAft>
+            <a:buFontTx/>
+            <a:buNone/>
+          </a:pPr>
+          <a:r>
+            <a:rPr lang="en-US" sz="2400" kern="1200" dirty="0">
+              <a:solidFill>
+                <a:schemeClr val="bg1"/>
+              </a:solidFill>
+              <a:latin typeface="Questrial" panose="02000000000000000000"/>
+            </a:rPr>
+            <a:t>2003 – 2018 sales data by year and borough</a:t>
+          </a:r>
+        </a:p>
+      </dsp:txBody>
+      <dsp:txXfrm>
+        <a:off x="3614504" y="64227"/>
+        <a:ext cx="3691294" cy="1250409"/>
+      </dsp:txXfrm>
+    </dsp:sp>
+    <dsp:sp modelId="{1D229A78-2F52-4E53-95D9-1CE10743129F}">
+      <dsp:nvSpPr>
+        <dsp:cNvPr id="0" name=""/>
+        <dsp:cNvSpPr/>
+      </dsp:nvSpPr>
+      <dsp:spPr>
+        <a:xfrm rot="5400000">
+          <a:off x="4303679" y="3149410"/>
+          <a:ext cx="1312930" cy="1494724"/>
+        </a:xfrm>
+        <a:prstGeom prst="bentUpArrow">
+          <a:avLst>
+            <a:gd name="adj1" fmla="val 32840"/>
+            <a:gd name="adj2" fmla="val 25000"/>
+            <a:gd name="adj3" fmla="val 35780"/>
+          </a:avLst>
+        </a:prstGeom>
+        <a:solidFill>
+          <a:schemeClr val="dk2">
+            <a:tint val="50000"/>
+            <a:hueOff val="0"/>
+            <a:satOff val="0"/>
+            <a:lumOff val="0"/>
+            <a:alphaOff val="0"/>
+          </a:schemeClr>
+        </a:solidFill>
+        <a:ln w="19050" cap="rnd" cmpd="sng" algn="ctr">
+          <a:solidFill>
+            <a:schemeClr val="dk2">
+              <a:shade val="80000"/>
+              <a:hueOff val="0"/>
+              <a:satOff val="0"/>
+              <a:lumOff val="0"/>
+              <a:alphaOff val="0"/>
+            </a:schemeClr>
+          </a:solidFill>
+          <a:prstDash val="solid"/>
+        </a:ln>
+        <a:effectLst/>
+      </dsp:spPr>
+      <dsp:style>
+        <a:lnRef idx="2">
+          <a:scrgbClr r="0" g="0" b="0"/>
+        </a:lnRef>
+        <a:fillRef idx="1">
+          <a:scrgbClr r="0" g="0" b="0"/>
+        </a:fillRef>
+        <a:effectRef idx="0">
+          <a:scrgbClr r="0" g="0" b="0"/>
+        </a:effectRef>
+        <a:fontRef idx="minor"/>
+      </dsp:style>
+    </dsp:sp>
+    <dsp:sp modelId="{D62DD6A4-A238-4782-8FED-F742C3E33E47}">
+      <dsp:nvSpPr>
+        <dsp:cNvPr id="0" name=""/>
+        <dsp:cNvSpPr/>
+      </dsp:nvSpPr>
+      <dsp:spPr>
+        <a:xfrm>
+          <a:off x="3186108" y="1697536"/>
+          <a:ext cx="3467849" cy="1408529"/>
+        </a:xfrm>
+        <a:prstGeom prst="roundRect">
+          <a:avLst>
+            <a:gd name="adj" fmla="val 16670"/>
+          </a:avLst>
+        </a:prstGeom>
+        <a:solidFill>
+          <a:schemeClr val="dk2">
+            <a:hueOff val="0"/>
+            <a:satOff val="0"/>
+            <a:lumOff val="0"/>
+            <a:alphaOff val="0"/>
+          </a:schemeClr>
+        </a:solidFill>
+        <a:ln w="19050" cap="rnd" cmpd="sng" algn="ctr">
+          <a:solidFill>
+            <a:schemeClr val="lt2">
+              <a:hueOff val="0"/>
+              <a:satOff val="0"/>
+              <a:lumOff val="0"/>
+              <a:alphaOff val="0"/>
+            </a:schemeClr>
+          </a:solidFill>
+          <a:prstDash val="solid"/>
+        </a:ln>
+        <a:effectLst/>
+      </dsp:spPr>
+      <dsp:style>
+        <a:lnRef idx="2">
+          <a:scrgbClr r="0" g="0" b="0"/>
+        </a:lnRef>
+        <a:fillRef idx="1">
+          <a:scrgbClr r="0" g="0" b="0"/>
+        </a:fillRef>
+        <a:effectRef idx="0">
+          <a:scrgbClr r="0" g="0" b="0"/>
+        </a:effectRef>
+        <a:fontRef idx="minor">
+          <a:schemeClr val="lt1"/>
+        </a:fontRef>
+      </dsp:style>
+      <dsp:txBody>
+        <a:bodyPr spcFirstLastPara="0" vert="horz" wrap="square" lIns="121920" tIns="121920" rIns="121920" bIns="121920" numCol="1" spcCol="1270" anchor="ctr" anchorCtr="0">
+          <a:noAutofit/>
+        </a:bodyPr>
+        <a:lstStyle/>
+        <a:p>
+          <a:pPr marL="0" lvl="0" indent="0" algn="ctr" defTabSz="1422400">
+            <a:lnSpc>
+              <a:spcPct val="90000"/>
+            </a:lnSpc>
+            <a:spcBef>
+              <a:spcPct val="0"/>
+            </a:spcBef>
+            <a:spcAft>
+              <a:spcPct val="35000"/>
+            </a:spcAft>
+            <a:buNone/>
+          </a:pPr>
+          <a:r>
+            <a:rPr lang="en-US" sz="3200" b="1" kern="1200" dirty="0">
+              <a:effectLst>
+                <a:outerShdw blurRad="38100" dist="38100" dir="2700000" algn="tl">
+                  <a:srgbClr val="000000">
+                    <a:alpha val="43137"/>
+                  </a:srgbClr>
+                </a:outerShdw>
+              </a:effectLst>
+              <a:latin typeface="Questrial" panose="02000000000000000000"/>
+            </a:rPr>
+            <a:t>1</a:t>
+          </a:r>
+          <a:r>
+            <a:rPr lang="en-US" sz="3200" kern="1200" dirty="0">
+              <a:latin typeface="Questrial" panose="02000000000000000000"/>
+            </a:rPr>
+            <a:t> SQL database</a:t>
+          </a:r>
+        </a:p>
+      </dsp:txBody>
+      <dsp:txXfrm>
+        <a:off x="3254879" y="1766307"/>
+        <a:ext cx="3330307" cy="1270987"/>
+      </dsp:txXfrm>
+    </dsp:sp>
+    <dsp:sp modelId="{D982D841-0F4E-4194-BA6E-8265C0EE41E6}">
+      <dsp:nvSpPr>
+        <dsp:cNvPr id="0" name=""/>
+        <dsp:cNvSpPr/>
+      </dsp:nvSpPr>
+      <dsp:spPr>
+        <a:xfrm>
+          <a:off x="6849129" y="1697527"/>
+          <a:ext cx="3639405" cy="1250409"/>
+        </a:xfrm>
+        <a:prstGeom prst="rect">
+          <a:avLst/>
+        </a:prstGeom>
+        <a:noFill/>
+        <a:ln>
+          <a:noFill/>
+        </a:ln>
+        <a:effectLst/>
+      </dsp:spPr>
+      <dsp:style>
+        <a:lnRef idx="0">
+          <a:scrgbClr r="0" g="0" b="0"/>
+        </a:lnRef>
+        <a:fillRef idx="0">
+          <a:scrgbClr r="0" g="0" b="0"/>
+        </a:fillRef>
+        <a:effectRef idx="0">
+          <a:scrgbClr r="0" g="0" b="0"/>
+        </a:effectRef>
+        <a:fontRef idx="minor"/>
+      </dsp:style>
+      <dsp:txBody>
+        <a:bodyPr spcFirstLastPara="0" vert="horz" wrap="square" lIns="91440" tIns="91440" rIns="91440" bIns="91440" numCol="1" spcCol="1270" anchor="ctr" anchorCtr="0">
+          <a:noAutofit/>
+        </a:bodyPr>
+        <a:lstStyle/>
+        <a:p>
+          <a:pPr marL="228600" lvl="1" indent="-228600" algn="l" defTabSz="1066800">
+            <a:lnSpc>
+              <a:spcPct val="90000"/>
+            </a:lnSpc>
+            <a:spcBef>
+              <a:spcPct val="0"/>
+            </a:spcBef>
+            <a:spcAft>
+              <a:spcPct val="15000"/>
+            </a:spcAft>
+            <a:buFontTx/>
+            <a:buNone/>
+          </a:pPr>
+          <a:r>
+            <a:rPr lang="en-US" sz="2400" kern="1200" dirty="0">
+              <a:solidFill>
+                <a:schemeClr val="bg1"/>
+              </a:solidFill>
+              <a:latin typeface="Questrial" panose="02000000000000000000"/>
+            </a:rPr>
+            <a:t>loaded all spreadsheets into </a:t>
+          </a:r>
+          <a:r>
+            <a:rPr lang="en-US" sz="2400" kern="1200" dirty="0" err="1">
+              <a:solidFill>
+                <a:schemeClr val="bg1"/>
+              </a:solidFill>
+              <a:latin typeface="Questrial" panose="02000000000000000000"/>
+            </a:rPr>
+            <a:t>pgAdmin</a:t>
+          </a:r>
+          <a:endParaRPr lang="en-US" sz="2400" kern="1200" dirty="0">
+            <a:solidFill>
+              <a:schemeClr val="bg1"/>
+            </a:solidFill>
+            <a:latin typeface="Questrial" panose="02000000000000000000"/>
+          </a:endParaRPr>
+        </a:p>
+      </dsp:txBody>
+      <dsp:txXfrm>
+        <a:off x="6849129" y="1697527"/>
+        <a:ext cx="3639405" cy="1250409"/>
+      </dsp:txXfrm>
+    </dsp:sp>
+    <dsp:sp modelId="{5B9741FF-6FA9-4FBF-AF78-BD8E8D06D574}">
+      <dsp:nvSpPr>
+        <dsp:cNvPr id="0" name=""/>
+        <dsp:cNvSpPr/>
+      </dsp:nvSpPr>
+      <dsp:spPr>
+        <a:xfrm>
+          <a:off x="5892124" y="3260501"/>
+          <a:ext cx="3263804" cy="1349106"/>
+        </a:xfrm>
+        <a:prstGeom prst="roundRect">
+          <a:avLst>
+            <a:gd name="adj" fmla="val 16670"/>
+          </a:avLst>
+        </a:prstGeom>
+        <a:solidFill>
+          <a:schemeClr val="dk2">
+            <a:hueOff val="0"/>
+            <a:satOff val="0"/>
+            <a:lumOff val="0"/>
+            <a:alphaOff val="0"/>
+          </a:schemeClr>
+        </a:solidFill>
+        <a:ln w="19050" cap="rnd" cmpd="sng" algn="ctr">
+          <a:solidFill>
+            <a:schemeClr val="lt2">
+              <a:hueOff val="0"/>
+              <a:satOff val="0"/>
+              <a:lumOff val="0"/>
+              <a:alphaOff val="0"/>
+            </a:schemeClr>
+          </a:solidFill>
+          <a:prstDash val="solid"/>
+        </a:ln>
+        <a:effectLst/>
+      </dsp:spPr>
+      <dsp:style>
+        <a:lnRef idx="2">
+          <a:scrgbClr r="0" g="0" b="0"/>
+        </a:lnRef>
+        <a:fillRef idx="1">
+          <a:scrgbClr r="0" g="0" b="0"/>
+        </a:fillRef>
+        <a:effectRef idx="0">
+          <a:scrgbClr r="0" g="0" b="0"/>
+        </a:effectRef>
+        <a:fontRef idx="minor">
+          <a:schemeClr val="lt1"/>
+        </a:fontRef>
+      </dsp:style>
+      <dsp:txBody>
+        <a:bodyPr spcFirstLastPara="0" vert="horz" wrap="square" lIns="121920" tIns="121920" rIns="121920" bIns="121920" numCol="1" spcCol="1270" anchor="ctr" anchorCtr="0">
+          <a:noAutofit/>
+        </a:bodyPr>
+        <a:lstStyle/>
+        <a:p>
+          <a:pPr marL="0" lvl="0" indent="0" algn="ctr" defTabSz="1422400">
+            <a:lnSpc>
+              <a:spcPct val="90000"/>
+            </a:lnSpc>
+            <a:spcBef>
+              <a:spcPct val="0"/>
+            </a:spcBef>
+            <a:spcAft>
+              <a:spcPct val="35000"/>
+            </a:spcAft>
+            <a:buNone/>
+          </a:pPr>
+          <a:r>
+            <a:rPr lang="en-US" sz="3200" b="1" kern="1200" dirty="0">
+              <a:effectLst>
+                <a:outerShdw blurRad="38100" dist="38100" dir="2700000" algn="tl">
+                  <a:srgbClr val="000000">
+                    <a:alpha val="43137"/>
+                  </a:srgbClr>
+                </a:outerShdw>
+              </a:effectLst>
+              <a:latin typeface="Questrial" panose="02000000000000000000"/>
+            </a:rPr>
+            <a:t>5</a:t>
+          </a:r>
+          <a:r>
+            <a:rPr lang="en-US" sz="3200" kern="1200" dirty="0">
+              <a:latin typeface="Questrial" panose="02000000000000000000"/>
+            </a:rPr>
+            <a:t> csv files</a:t>
+          </a:r>
+        </a:p>
+      </dsp:txBody>
+      <dsp:txXfrm>
+        <a:off x="5957994" y="3326371"/>
+        <a:ext cx="3132064" cy="1217366"/>
+      </dsp:txXfrm>
+    </dsp:sp>
+    <dsp:sp modelId="{39A2C4B4-D988-4263-902A-FDBB1806567C}">
+      <dsp:nvSpPr>
+        <dsp:cNvPr id="0" name=""/>
+        <dsp:cNvSpPr/>
+      </dsp:nvSpPr>
+      <dsp:spPr>
+        <a:xfrm>
+          <a:off x="9183394" y="3337353"/>
+          <a:ext cx="1684408" cy="1250409"/>
+        </a:xfrm>
+        <a:prstGeom prst="rect">
+          <a:avLst/>
+        </a:prstGeom>
+        <a:noFill/>
+        <a:ln>
+          <a:noFill/>
+        </a:ln>
+        <a:effectLst/>
+      </dsp:spPr>
+      <dsp:style>
+        <a:lnRef idx="0">
+          <a:scrgbClr r="0" g="0" b="0"/>
+        </a:lnRef>
+        <a:fillRef idx="0">
+          <a:scrgbClr r="0" g="0" b="0"/>
+        </a:fillRef>
+        <a:effectRef idx="0">
+          <a:scrgbClr r="0" g="0" b="0"/>
+        </a:effectRef>
+        <a:fontRef idx="minor"/>
+      </dsp:style>
+      <dsp:txBody>
+        <a:bodyPr spcFirstLastPara="0" vert="horz" wrap="square" lIns="91440" tIns="91440" rIns="91440" bIns="91440" numCol="1" spcCol="1270" anchor="ctr" anchorCtr="0">
+          <a:noAutofit/>
+        </a:bodyPr>
+        <a:lstStyle/>
+        <a:p>
+          <a:pPr marL="228600" lvl="1" indent="-228600" algn="l" defTabSz="1066800">
+            <a:lnSpc>
+              <a:spcPct val="90000"/>
+            </a:lnSpc>
+            <a:spcBef>
+              <a:spcPct val="0"/>
+            </a:spcBef>
+            <a:spcAft>
+              <a:spcPct val="15000"/>
+            </a:spcAft>
+            <a:buFontTx/>
+            <a:buNone/>
+          </a:pPr>
+          <a:r>
+            <a:rPr lang="en-US" sz="2400" kern="1200" dirty="0">
+              <a:solidFill>
+                <a:schemeClr val="bg1"/>
+              </a:solidFill>
+              <a:latin typeface="Questrial" panose="02000000000000000000"/>
+            </a:rPr>
+            <a:t>export data by borough</a:t>
+          </a:r>
+        </a:p>
+      </dsp:txBody>
+      <dsp:txXfrm>
+        <a:off x="9183394" y="3337353"/>
+        <a:ext cx="1684408" cy="1250409"/>
+      </dsp:txXfrm>
+    </dsp:sp>
+  </dsp:spTree>
+</dsp:drawing>
+</file>
+
+<file path=ppt/diagrams/layout1.xml><?xml version="1.0" encoding="utf-8"?>
+<dgm:layoutDef xmlns:dgm="http://schemas.openxmlformats.org/drawingml/2006/diagram" xmlns:a="http://schemas.openxmlformats.org/drawingml/2006/main" uniqueId="urn:microsoft.com/office/officeart/2005/8/layout/StepDownProcess">
+  <dgm:title val=""/>
+  <dgm:desc val=""/>
+  <dgm:catLst>
+    <dgm:cat type="process" pri="1600"/>
+  </dgm:catLst>
+  <dgm:sampData>
+    <dgm:dataModel>
+      <dgm:ptLst>
+        <dgm:pt modelId="0" type="doc"/>
+        <dgm:pt modelId="10">
+          <dgm:prSet phldr="1"/>
+        </dgm:pt>
+        <dgm:pt modelId="11">
+          <dgm:prSet phldr="1"/>
+        </dgm:pt>
+        <dgm:pt modelId="20">
+          <dgm:prSet phldr="1"/>
+        </dgm:pt>
+        <dgm:pt modelId="21">
+          <dgm:prSet phldr="1"/>
+        </dgm:pt>
+        <dgm:pt modelId="30">
+          <dgm:prSet phldr="1"/>
+        </dgm:pt>
+        <dgm:pt modelId="31">
+          <dgm:prSet phldr="1"/>
+        </dgm:pt>
+      </dgm:ptLst>
+      <dgm:cxnLst>
+        <dgm:cxn modelId="60" srcId="0" destId="10" srcOrd="0" destOrd="0"/>
+        <dgm:cxn modelId="12" srcId="10" destId="11" srcOrd="0" destOrd="0"/>
+        <dgm:cxn modelId="70" srcId="0" destId="20" srcOrd="1" destOrd="0"/>
+        <dgm:cxn modelId="22" srcId="20" destId="21" srcOrd="0" destOrd="0"/>
+        <dgm:cxn modelId="80" srcId="0" destId="30" srcOrd="2" destOrd="0"/>
+        <dgm:cxn modelId="32" srcId="30" destId="31" srcOrd="0" destOrd="0"/>
+      </dgm:cxnLst>
+      <dgm:bg/>
+      <dgm:whole/>
+    </dgm:dataModel>
+  </dgm:sampData>
+  <dgm:styleData>
+    <dgm:dataModel>
+      <dgm:ptLst>
+        <dgm:pt modelId="0" type="doc"/>
+        <dgm:pt modelId="10">
+          <dgm:prSet phldr="1"/>
+        </dgm:pt>
+        <dgm:pt modelId="20">
+          <dgm:prSet phldr="1"/>
+        </dgm:pt>
+      </dgm:ptLst>
+      <dgm:cxnLst>
+        <dgm:cxn modelId="60" srcId="0" destId="10" srcOrd="0" destOrd="0"/>
+        <dgm:cxn modelId="70" srcId="0" destId="20" srcOrd="1" destOrd="0"/>
+      </dgm:cxnLst>
+      <dgm:bg/>
+      <dgm:whole/>
+    </dgm:dataModel>
+  </dgm:styleData>
+  <dgm:clrData>
+    <dgm:dataModel>
+      <dgm:ptLst>
+        <dgm:pt modelId="0" type="doc"/>
+        <dgm:pt modelId="10">
+          <dgm:prSet phldr="1"/>
+        </dgm:pt>
+        <dgm:pt modelId="20">
+          <dgm:prSet phldr="1"/>
+        </dgm:pt>
+        <dgm:pt modelId="30">
+          <dgm:prSet phldr="1"/>
+        </dgm:pt>
+        <dgm:pt modelId="40">
+          <dgm:prSet phldr="1"/>
+        </dgm:pt>
+      </dgm:ptLst>
+      <dgm:cxnLst>
+        <dgm:cxn modelId="60" srcId="0" destId="10" srcOrd="0" destOrd="0"/>
+        <dgm:cxn modelId="70" srcId="0" destId="20" srcOrd="1" destOrd="0"/>
+        <dgm:cxn modelId="80" srcId="0" destId="30" srcOrd="2" destOrd="0"/>
+        <dgm:cxn modelId="90" srcId="0" destId="40" srcOrd="3" destOrd="0"/>
+      </dgm:cxnLst>
+      <dgm:bg/>
+      <dgm:whole/>
+    </dgm:dataModel>
+  </dgm:clrData>
+  <dgm:layoutNode name="rootnode">
+    <dgm:varLst>
+      <dgm:chMax/>
+      <dgm:chPref/>
+      <dgm:dir/>
+      <dgm:animLvl val="lvl"/>
+    </dgm:varLst>
+    <dgm:choose name="Name0">
+      <dgm:if name="Name1" func="var" arg="dir" op="equ" val="norm">
+        <dgm:alg type="snake">
+          <dgm:param type="grDir" val="tL"/>
+          <dgm:param type="flowDir" val="row"/>
+          <dgm:param type="off" val="off"/>
+          <dgm:param type="bkpt" val="fixed"/>
+          <dgm:param type="bkPtFixedVal" val="1"/>
+        </dgm:alg>
+      </dgm:if>
+      <dgm:else name="Name2">
+        <dgm:alg type="snake">
+          <dgm:param type="grDir" val="tR"/>
+          <dgm:param type="flowDir" val="row"/>
+          <dgm:param type="off" val="off"/>
+          <dgm:param type="bkpt" val="fixed"/>
+          <dgm:param type="bkPtFixedVal" val="1"/>
+        </dgm:alg>
+      </dgm:else>
+    </dgm:choose>
+    <dgm:shape xmlns:r="http://schemas.openxmlformats.org/officeDocument/2006/relationships" r:blip="">
+      <dgm:adjLst/>
+    </dgm:shape>
+    <dgm:choose name="Name3">
+      <dgm:if name="Name4" func="var" arg="dir" op="equ" val="norm">
+        <dgm:constrLst>
+          <dgm:constr type="alignOff" forName="rootnode" val="0.48"/>
+          <dgm:constr type="primFontSz" for="des" forName="ParentText" val="65"/>
+          <dgm:constr type="primFontSz" for="des" forName="ChildText" refType="primFontSz" refFor="des" refForName="ParentText" op="lte"/>
+          <dgm:constr type="w" for="ch" forName="composite" refType="w"/>
+          <dgm:constr type="h" for="ch" forName="composite" refType="h"/>
+          <dgm:constr type="sp" refType="h" refFor="ch" refForName="composite" op="equ" fact="-0.38"/>
+        </dgm:constrLst>
+      </dgm:if>
+      <dgm:else name="Name5">
+        <dgm:constrLst>
+          <dgm:constr type="alignOff" forName="rootnode" val="0.48"/>
+          <dgm:constr type="primFontSz" for="des" forName="ParentText" val="65"/>
+          <dgm:constr type="primFontSz" for="des" forName="ChildText" refType="primFontSz" refFor="des" refForName="ParentText" op="lte"/>
+          <dgm:constr type="w" for="ch" forName="composite" refType="w"/>
+          <dgm:constr type="h" for="ch" forName="composite" refType="h"/>
+          <dgm:constr type="sp" refType="h" refFor="ch" refForName="composite" op="equ" fact="-0.38"/>
+        </dgm:constrLst>
+      </dgm:else>
+    </dgm:choose>
+    <dgm:forEach name="nodesForEach" axis="ch" ptType="node">
+      <dgm:layoutNode name="composite">
+        <dgm:alg type="composite">
+          <dgm:param type="ar" val="1.2439"/>
+        </dgm:alg>
+        <dgm:shape xmlns:r="http://schemas.openxmlformats.org/officeDocument/2006/relationships" r:blip="">
+          <dgm:adjLst/>
+        </dgm:shape>
+        <dgm:choose name="Name6">
+          <dgm:if name="Name7" func="var" arg="dir" op="equ" val="norm">
+            <dgm:constrLst>
+              <dgm:constr type="l" for="ch" forName="bentUpArrow1" refType="w" fact="0.07"/>
+              <dgm:constr type="t" for="ch" forName="bentUpArrow1" refType="h" fact="0.524"/>
+              <dgm:constr type="w" for="ch" forName="bentUpArrow1" refType="w" fact="0.3844"/>
+              <dgm:constr type="h" for="ch" forName="bentUpArrow1" refType="h" fact="0.42"/>
+              <dgm:constr type="l" for="ch" forName="ParentText" refType="w" fact="0"/>
+              <dgm:constr type="t" for="ch" forName="ParentText" refType="h" fact="0"/>
+              <dgm:constr type="w" for="ch" forName="ParentText" refType="w" fact="0.5684"/>
+              <dgm:constr type="h" for="ch" forName="ParentText" refType="h" fact="0.4949"/>
+              <dgm:constr type="l" for="ch" forName="ChildText" refType="w" refFor="ch" refForName="ParentText"/>
+              <dgm:constr type="t" for="ch" forName="ChildText" refType="h" fact="0.05"/>
+              <dgm:constr type="w" for="ch" forName="ChildText" refType="w" fact="0.4134"/>
+              <dgm:constr type="h" for="ch" forName="ChildText" refType="h" fact="0.4"/>
+              <dgm:constr type="l" for="ch" forName="FinalChildText" refType="w" refFor="ch" refForName="ParentText"/>
+              <dgm:constr type="t" for="ch" forName="FinalChildText" refType="h" fact="0.05"/>
+              <dgm:constr type="w" for="ch" forName="FinalChildText" refType="w" fact="0.4134"/>
+              <dgm:constr type="h" for="ch" forName="FinalChildText" refType="h" fact="0.4"/>
+            </dgm:constrLst>
+          </dgm:if>
+          <dgm:else name="Name8">
+            <dgm:constrLst>
+              <dgm:constr type="r" for="ch" forName="bentUpArrow1" refType="w" fact="0.97"/>
+              <dgm:constr type="t" for="ch" forName="bentUpArrow1" refType="h" fact="0.524"/>
+              <dgm:constr type="w" for="ch" forName="bentUpArrow1" refType="w" fact="0.3844"/>
+              <dgm:constr type="h" for="ch" forName="bentUpArrow1" refType="h" fact="0.42"/>
+              <dgm:constr type="l" for="ch" forName="ParentText" refType="w" fact="0.4316"/>
+              <dgm:constr type="t" for="ch" forName="ParentText" refType="h" fact="0"/>
+              <dgm:constr type="w" for="ch" forName="ParentText" refType="w" fact="0.5684"/>
+              <dgm:constr type="h" for="ch" forName="ParentText" refType="h" fact="0.4949"/>
+              <dgm:constr type="l" for="ch" forName="ChildText" refType="w" fact="0"/>
+              <dgm:constr type="t" for="ch" forName="ChildText" refType="h" fact="0.05"/>
+              <dgm:constr type="w" for="ch" forName="ChildText" refType="w" fact="0.4134"/>
+              <dgm:constr type="h" for="ch" forName="ChildText" refType="h" fact="0.4"/>
+              <dgm:constr type="l" for="ch" forName="FinalChildText" refType="w" fact="0"/>
+              <dgm:constr type="t" for="ch" forName="FinalChildText" refType="h" fact="0.05"/>
+              <dgm:constr type="w" for="ch" forName="FinalChildText" refType="w" fact="0.4134"/>
+              <dgm:constr type="h" for="ch" forName="FinalChildText" refType="h" fact="0.4"/>
+            </dgm:constrLst>
+          </dgm:else>
+        </dgm:choose>
+        <dgm:choose name="Name9">
+          <dgm:if name="Name10" axis="followSib" ptType="node" func="cnt" op="gte" val="1">
+            <dgm:layoutNode name="bentUpArrow1" styleLbl="alignImgPlace1">
+              <dgm:alg type="sp"/>
+              <dgm:choose name="Name11">
+                <dgm:if name="Name12" func="var" arg="dir" op="equ" val="norm">
+                  <dgm:shape xmlns:r="http://schemas.openxmlformats.org/officeDocument/2006/relationships" rot="90" type="bentUpArrow" r:blip="">
+                    <dgm:adjLst>
+                      <dgm:adj idx="1" val="0.3284"/>
+                      <dgm:adj idx="2" val="0.25"/>
+                      <dgm:adj idx="3" val="0.3578"/>
+                    </dgm:adjLst>
+                  </dgm:shape>
+                </dgm:if>
+                <dgm:else name="Name13">
+                  <dgm:shape xmlns:r="http://schemas.openxmlformats.org/officeDocument/2006/relationships" rot="180" type="bentArrow" r:blip="">
+                    <dgm:adjLst>
+                      <dgm:adj idx="1" val="0.3284"/>
+                      <dgm:adj idx="2" val="0.25"/>
+                      <dgm:adj idx="3" val="0.3578"/>
+                      <dgm:adj idx="4" val="0"/>
+                    </dgm:adjLst>
+                  </dgm:shape>
+                </dgm:else>
+              </dgm:choose>
+              <dgm:presOf/>
+            </dgm:layoutNode>
+          </dgm:if>
+          <dgm:else name="Name14"/>
+        </dgm:choose>
+        <dgm:layoutNode name="ParentText" styleLbl="node1">
+          <dgm:varLst>
+            <dgm:chMax val="1"/>
+            <dgm:chPref val="1"/>
+            <dgm:bulletEnabled val="1"/>
+          </dgm:varLst>
+          <dgm:alg type="tx"/>
+          <dgm:shape xmlns:r="http://schemas.openxmlformats.org/officeDocument/2006/relationships" type="roundRect" r:blip="">
+            <dgm:adjLst>
+              <dgm:adj idx="1" val="0.1667"/>
+            </dgm:adjLst>
+          </dgm:shape>
+          <dgm:presOf axis="self" ptType="node"/>
+          <dgm:constrLst>
+            <dgm:constr type="lMarg" refType="primFontSz" fact="0.3"/>
+            <dgm:constr type="rMarg" refType="primFontSz" fact="0.3"/>
+            <dgm:constr type="tMarg" refType="primFontSz" fact="0.3"/>
+            <dgm:constr type="bMarg" refType="primFontSz" fact="0.3"/>
+          </dgm:constrLst>
+          <dgm:ruleLst>
+            <dgm:rule type="primFontSz" val="5" fact="NaN" max="NaN"/>
+          </dgm:ruleLst>
+        </dgm:layoutNode>
+        <dgm:choose name="Name15">
+          <dgm:if name="Name16" axis="followSib" ptType="node" func="cnt" op="equ" val="0">
+            <dgm:choose name="Name17">
+              <dgm:if name="Name18" axis="ch" ptType="node" func="cnt" op="gte" val="1">
+                <dgm:layoutNode name="FinalChildText" styleLbl="revTx">
+                  <dgm:varLst>
+                    <dgm:chMax val="0"/>
+                    <dgm:chPref val="0"/>
+                    <dgm:bulletEnabled val="1"/>
+                  </dgm:varLst>
+                  <dgm:alg type="tx">
+                    <dgm:param type="stBulletLvl" val="1"/>
+                    <dgm:param type="txAnchorVertCh" val="mid"/>
+                    <dgm:param type="parTxLTRAlign" val="l"/>
+                  </dgm:alg>
+                  <dgm:shape xmlns:r="http://schemas.openxmlformats.org/officeDocument/2006/relationships" type="rect" r:blip="">
+                    <dgm:adjLst/>
+                  </dgm:shape>
+                  <dgm:presOf axis="des" ptType="node"/>
+                  <dgm:constrLst>
+                    <dgm:constr type="lMarg" refType="primFontSz" fact="0.3"/>
+                    <dgm:constr type="rMarg" refType="primFontSz" fact="0.3"/>
+                    <dgm:constr type="tMarg" refType="primFontSz" fact="0.3"/>
+                    <dgm:constr type="bMarg" refType="primFontSz" fact="0.3"/>
+                  </dgm:constrLst>
+                  <dgm:ruleLst>
+                    <dgm:rule type="primFontSz" val="5" fact="NaN" max="NaN"/>
+                  </dgm:ruleLst>
+                </dgm:layoutNode>
+              </dgm:if>
+              <dgm:else name="Name19"/>
+            </dgm:choose>
+          </dgm:if>
+          <dgm:else name="Name20">
+            <dgm:layoutNode name="ChildText" styleLbl="revTx">
+              <dgm:varLst>
+                <dgm:chMax val="0"/>
+                <dgm:chPref val="0"/>
+                <dgm:bulletEnabled val="1"/>
+              </dgm:varLst>
+              <dgm:alg type="tx">
+                <dgm:param type="stBulletLvl" val="1"/>
+                <dgm:param type="txAnchorVertCh" val="mid"/>
+                <dgm:param type="parTxLTRAlign" val="l"/>
+              </dgm:alg>
+              <dgm:shape xmlns:r="http://schemas.openxmlformats.org/officeDocument/2006/relationships" type="rect" r:blip="">
+                <dgm:adjLst/>
+              </dgm:shape>
+              <dgm:presOf axis="des" ptType="node"/>
+              <dgm:constrLst>
+                <dgm:constr type="lMarg" refType="primFontSz" fact="0.3"/>
+                <dgm:constr type="rMarg" refType="primFontSz" fact="0.3"/>
+                <dgm:constr type="tMarg" refType="primFontSz" fact="0.3"/>
+                <dgm:constr type="bMarg" refType="primFontSz" fact="0.3"/>
+              </dgm:constrLst>
+              <dgm:ruleLst>
+                <dgm:rule type="primFontSz" val="5" fact="NaN" max="NaN"/>
+              </dgm:ruleLst>
+            </dgm:layoutNode>
+          </dgm:else>
+        </dgm:choose>
+      </dgm:layoutNode>
+      <dgm:forEach name="sibTransForEach" axis="followSib" ptType="sibTrans" cnt="1">
+        <dgm:layoutNode name="sibTrans">
+          <dgm:alg type="sp"/>
+          <dgm:shape xmlns:r="http://schemas.openxmlformats.org/officeDocument/2006/relationships" r:blip="">
+            <dgm:adjLst/>
+          </dgm:shape>
+        </dgm:layoutNode>
+      </dgm:forEach>
+    </dgm:forEach>
+  </dgm:layoutNode>
+</dgm:layoutDef>
+</file>
+
+<file path=ppt/diagrams/quickStyle1.xml><?xml version="1.0" encoding="utf-8"?>
+<dgm:styleDef xmlns:dgm="http://schemas.openxmlformats.org/drawingml/2006/diagram" xmlns:a="http://schemas.openxmlformats.org/drawingml/2006/main" uniqueId="urn:microsoft.com/office/officeart/2005/8/quickstyle/simple1">
+  <dgm:title val=""/>
+  <dgm:desc val=""/>
+  <dgm:catLst>
+    <dgm:cat type="simple" pri="10100"/>
+  </dgm:catLst>
+  <dgm:scene3d>
+    <a:camera prst="orthographicFront"/>
+    <a:lightRig rig="threePt" dir="t"/>
+  </dgm:scene3d>
+  <dgm:styleLbl name="node0">
+    <dgm:scene3d>
+      <a:camera prst="orthographicFront"/>
+      <a:lightRig rig="threePt" dir="t"/>
+    </dgm:scene3d>
+    <dgm:sp3d/>
+    <dgm:txPr/>
+    <dgm:style>
+      <a:lnRef idx="2">
+        <a:scrgbClr r="0" g="0" b="0"/>
+      </a:lnRef>
+      <a:fillRef idx="1">
+        <a:scrgbClr r="0" g="0" b="0"/>
+      </a:fillRef>
+      <a:effectRef idx="0">
+        <a:scrgbClr r="0" g="0" b="0"/>
+      </a:effectRef>
+      <a:fontRef idx="minor">
+        <a:schemeClr val="lt1"/>
+      </a:fontRef>
+    </dgm:style>
+  </dgm:styleLbl>
+  <dgm:styleLbl name="lnNode1">
+    <dgm:scene3d>
+      <a:camera prst="orthographicFront"/>
+      <a:lightRig rig="threePt" dir="t"/>
+    </dgm:scene3d>
+    <dgm:sp3d/>
+    <dgm:txPr/>
+    <dgm:style>
+      <a:lnRef idx="2">
+        <a:scrgbClr r="0" g="0" b="0"/>
+      </a:lnRef>
+      <a:fillRef idx="1">
+        <a:scrgbClr r="0" g="0" b="0"/>
+      </a:fillRef>
+      <a:effectRef idx="0">
+        <a:scrgbClr r="0" g="0" b="0"/>
+      </a:effectRef>
+      <a:fontRef idx="minor">
+        <a:schemeClr val="lt1"/>
+      </a:fontRef>
+    </dgm:style>
+  </dgm:styleLbl>
+  <dgm:styleLbl name="vennNode1">
+    <dgm:scene3d>
+      <a:camera prst="orthographicFront"/>
+      <a:lightRig rig="threePt" dir="t"/>
+    </dgm:scene3d>
+    <dgm:sp3d/>
+    <dgm:txPr/>
+    <dgm:style>
+      <a:lnRef idx="2">
+        <a:scrgbClr r="0" g="0" b="0"/>
+      </a:lnRef>
+      <a:fillRef idx="1">
+        <a:scrgbClr r="0" g="0" b="0"/>
+      </a:fillRef>
+      <a:effectRef idx="0">
+        <a:scrgbClr r="0" g="0" b="0"/>
+      </a:effectRef>
+      <a:fontRef idx="minor">
+        <a:schemeClr val="tx1"/>
+      </a:fontRef>
+    </dgm:style>
+  </dgm:styleLbl>
+  <dgm:styleLbl name="alignNode1">
+    <dgm:scene3d>
+      <a:camera prst="orthographicFront"/>
+      <a:lightRig rig="threePt" dir="t"/>
+    </dgm:scene3d>
+    <dgm:sp3d/>
+    <dgm:txPr/>
+    <dgm:style>
+      <a:lnRef idx="2">
+        <a:scrgbClr r="0" g="0" b="0"/>
+      </a:lnRef>
+      <a:fillRef idx="1">
+        <a:scrgbClr r="0" g="0" b="0"/>
+      </a:fillRef>
+      <a:effectRef idx="0">
+        <a:scrgbClr r="0" g="0" b="0"/>
+      </a:effectRef>
+      <a:fontRef idx="minor">
+        <a:schemeClr val="lt1"/>
+      </a:fontRef>
+    </dgm:style>
+  </dgm:styleLbl>
+  <dgm:styleLbl name="node1">
+    <dgm:scene3d>
+      <a:camera prst="orthographicFront"/>
+      <a:lightRig rig="threePt" dir="t"/>
+    </dgm:scene3d>
+    <dgm:sp3d/>
+    <dgm:txPr/>
+    <dgm:style>
+      <a:lnRef idx="2">
+        <a:scrgbClr r="0" g="0" b="0"/>
+      </a:lnRef>
+      <a:fillRef idx="1">
+        <a:scrgbClr r="0" g="0" b="0"/>
+      </a:fillRef>
+      <a:effectRef idx="0">
+        <a:scrgbClr r="0" g="0" b="0"/>
+      </a:effectRef>
+      <a:fontRef idx="minor">
+        <a:schemeClr val="lt1"/>
+      </a:fontRef>
+    </dgm:style>
+  </dgm:styleLbl>
+  <dgm:styleLbl name="node2">
+    <dgm:scene3d>
+      <a:camera prst="orthographicFront"/>
+      <a:lightRig rig="threePt" dir="t"/>
+    </dgm:scene3d>
+    <dgm:sp3d/>
+    <dgm:txPr/>
+    <dgm:style>
+      <a:lnRef idx="2">
+        <a:scrgbClr r="0" g="0" b="0"/>
+      </a:lnRef>
+      <a:fillRef idx="1">
+        <a:scrgbClr r="0" g="0" b="0"/>
+      </a:fillRef>
+      <a:effectRef idx="0">
+        <a:scrgbClr r="0" g="0" b="0"/>
+      </a:effectRef>
+      <a:fontRef idx="minor">
+        <a:schemeClr val="lt1"/>
+      </a:fontRef>
+    </dgm:style>
+  </dgm:styleLbl>
+  <dgm:styleLbl name="node3">
+    <dgm:scene3d>
+      <a:camera prst="orthographicFront"/>
+      <a:lightRig rig="threePt" dir="t"/>
+    </dgm:scene3d>
+    <dgm:sp3d/>
+    <dgm:txPr/>
+    <dgm:style>
+      <a:lnRef idx="2">
+        <a:scrgbClr r="0" g="0" b="0"/>
+      </a:lnRef>
+      <a:fillRef idx="1">
+        <a:scrgbClr r="0" g="0" b="0"/>
+      </a:fillRef>
+      <a:effectRef idx="0">
+        <a:scrgbClr r="0" g="0" b="0"/>
+      </a:effectRef>
+      <a:fontRef idx="minor">
+        <a:schemeClr val="lt1"/>
+      </a:fontRef>
+    </dgm:style>
+  </dgm:styleLbl>
+  <dgm:styleLbl name="node4">
+    <dgm:scene3d>
+      <a:camera prst="orthographicFront"/>
+      <a:lightRig rig="threePt" dir="t"/>
+    </dgm:scene3d>
+    <dgm:sp3d/>
+    <dgm:txPr/>
+    <dgm:style>
+      <a:lnRef idx="2">
+        <a:scrgbClr r="0" g="0" b="0"/>
+      </a:lnRef>
+      <a:fillRef idx="1">
+        <a:scrgbClr r="0" g="0" b="0"/>
+      </a:fillRef>
+      <a:effectRef idx="0">
+        <a:scrgbClr r="0" g="0" b="0"/>
+      </a:effectRef>
+      <a:fontRef idx="minor">
+        <a:schemeClr val="lt1"/>
+      </a:fontRef>
+    </dgm:style>
+  </dgm:styleLbl>
+  <dgm:styleLbl name="fgImgPlace1">
+    <dgm:scene3d>
+      <a:camera prst="orthographicFront"/>
+      <a:lightRig rig="threePt" dir="t"/>
+    </dgm:scene3d>
+    <dgm:sp3d/>
+    <dgm:txPr/>
+    <dgm:style>
+      <a:lnRef idx="2">
+        <a:scrgbClr r="0" g="0" b="0"/>
+      </a:lnRef>
+      <a:fillRef idx="1">
+        <a:scrgbClr r="0" g="0" b="0"/>
+      </a:fillRef>
+      <a:effectRef idx="0">
+        <a:scrgbClr r="0" g="0" b="0"/>
+      </a:effectRef>
+      <a:fontRef idx="minor"/>
+    </dgm:style>
+  </dgm:styleLbl>
+  <dgm:styleLbl name="alignImgPlace1">
+    <dgm:scene3d>
+      <a:camera prst="orthographicFront"/>
+      <a:lightRig rig="threePt" dir="t"/>
+    </dgm:scene3d>
+    <dgm:sp3d/>
+    <dgm:txPr/>
+    <dgm:style>
+      <a:lnRef idx="2">
+        <a:scrgbClr r="0" g="0" b="0"/>
+      </a:lnRef>
+      <a:fillRef idx="1">
+        <a:scrgbClr r="0" g="0" b="0"/>
+      </a:fillRef>
+      <a:effectRef idx="0">
+        <a:scrgbClr r="0" g="0" b="0"/>
+      </a:effectRef>
+      <a:fontRef idx="minor"/>
+    </dgm:style>
+  </dgm:styleLbl>
+  <dgm:styleLbl name="bgImgPlace1">
+    <dgm:scene3d>
+      <a:camera prst="orthographicFront"/>
+      <a:lightRig rig="threePt" dir="t"/>
+    </dgm:scene3d>
+    <dgm:sp3d/>
+    <dgm:txPr/>
+    <dgm:style>
+      <a:lnRef idx="2">
+        <a:scrgbClr r="0" g="0" b="0"/>
+      </a:lnRef>
+      <a:fillRef idx="1">
+        <a:scrgbClr r="0" g="0" b="0"/>
+      </a:fillRef>
+      <a:effectRef idx="0">
+        <a:scrgbClr r="0" g="0" b="0"/>
+      </a:effectRef>
+      <a:fontRef idx="minor"/>
+    </dgm:style>
+  </dgm:styleLbl>
+  <dgm:styleLbl name="sibTrans2D1">
+    <dgm:scene3d>
+      <a:camera prst="orthographicFront"/>
+      <a:lightRig rig="threePt" dir="t"/>
+    </dgm:scene3d>
+    <dgm:sp3d/>
+    <dgm:txPr/>
+    <dgm:style>
+      <a:lnRef idx="0">
+        <a:scrgbClr r="0" g="0" b="0"/>
+      </a:lnRef>
+      <a:fillRef idx="1">
+        <a:scrgbClr r="0" g="0" b="0"/>
+      </a:fillRef>
+      <a:effectRef idx="0">
+        <a:scrgbClr r="0" g="0" b="0"/>
+      </a:effectRef>
+      <a:fontRef idx="minor">
+        <a:schemeClr val="lt1"/>
+      </a:fontRef>
+    </dgm:style>
+  </dgm:styleLbl>
+  <dgm:styleLbl name="fgSibTrans2D1">
+    <dgm:scene3d>
+      <a:camera prst="orthographicFront"/>
+      <a:lightRig rig="threePt" dir="t"/>
+    </dgm:scene3d>
+    <dgm:sp3d/>
+    <dgm:txPr/>
+    <dgm:style>
+      <a:lnRef idx="0">
+        <a:scrgbClr r="0" g="0" b="0"/>
+      </a:lnRef>
+      <a:fillRef idx="1">
+        <a:scrgbClr r="0" g="0" b="0"/>
+      </a:fillRef>
+      <a:effectRef idx="0">
+        <a:scrgbClr r="0" g="0" b="0"/>
+      </a:effectRef>
+      <a:fontRef idx="minor">
+        <a:schemeClr val="lt1"/>
+      </a:fontRef>
+    </dgm:style>
+  </dgm:styleLbl>
+  <dgm:styleLbl name="bgSibTrans2D1">
+    <dgm:scene3d>
+      <a:camera prst="orthographicFront"/>
+      <a:lightRig rig="threePt" dir="t"/>
+    </dgm:scene3d>
+    <dgm:sp3d/>
+    <dgm:txPr/>
+    <dgm:style>
+      <a:lnRef idx="0">
+        <a:scrgbClr r="0" g="0" b="0"/>
+      </a:lnRef>
+      <a:fillRef idx="1">
+        <a:scrgbClr r="0" g="0" b="0"/>
+      </a:fillRef>
+      <a:effectRef idx="0">
+        <a:scrgbClr r="0" g="0" b="0"/>
+      </a:effectRef>
+      <a:fontRef idx="minor">
+        <a:schemeClr val="lt1"/>
+      </a:fontRef>
+    </dgm:style>
+  </dgm:styleLbl>
+  <dgm:styleLbl name="sibTrans1D1">
+    <dgm:scene3d>
+      <a:camera prst="orthographicFront"/>
+      <a:lightRig rig="threePt" dir="t"/>
+    </dgm:scene3d>
+    <dgm:sp3d/>
+    <dgm:txPr/>
+    <dgm:style>
+      <a:lnRef idx="1">
+        <a:scrgbClr r="0" g="0" b="0"/>
+      </a:lnRef>
+      <a:fillRef idx="0">
+        <a:scrgbClr r="0" g="0" b="0"/>
+      </a:fillRef>
+      <a:effectRef idx="0">
+        <a:scrgbClr r="0" g="0" b="0"/>
+      </a:effectRef>
+      <a:fontRef idx="minor"/>
+    </dgm:style>
+  </dgm:styleLbl>
+  <dgm:styleLbl name="callout">
+    <dgm:scene3d>
+      <a:camera prst="orthographicFront"/>
+      <a:lightRig rig="threePt" dir="t"/>
+    </dgm:scene3d>
+    <dgm:sp3d/>
+    <dgm:txPr/>
+    <dgm:style>
+      <a:lnRef idx="2">
+        <a:scrgbClr r="0" g="0" b="0"/>
+      </a:lnRef>
+      <a:fillRef idx="1">
+        <a:scrgbClr r="0" g="0" b="0"/>
+      </a:fillRef>
+      <a:effectRef idx="0">
+        <a:scrgbClr r="0" g="0" b="0"/>
+      </a:effectRef>
+      <a:fontRef idx="minor"/>
+    </dgm:style>
+  </dgm:styleLbl>
+  <dgm:styleLbl name="asst0">
+    <dgm:scene3d>
+      <a:camera prst="orthographicFront"/>
+      <a:lightRig rig="threePt" dir="t"/>
+    </dgm:scene3d>
+    <dgm:sp3d/>
+    <dgm:txPr/>
+    <dgm:style>
+      <a:lnRef idx="2">
+        <a:scrgbClr r="0" g="0" b="0"/>
+      </a:lnRef>
+      <a:fillRef idx="1">
+        <a:scrgbClr r="0" g="0" b="0"/>
+      </a:fillRef>
+      <a:effectRef idx="0">
+        <a:scrgbClr r="0" g="0" b="0"/>
+      </a:effectRef>
+      <a:fontRef idx="minor">
+        <a:schemeClr val="lt1"/>
+      </a:fontRef>
+    </dgm:style>
+  </dgm:styleLbl>
+  <dgm:styleLbl name="asst1">
+    <dgm:scene3d>
+      <a:camera prst="orthographicFront"/>
+      <a:lightRig rig="threePt" dir="t"/>
+    </dgm:scene3d>
+    <dgm:sp3d/>
+    <dgm:txPr/>
+    <dgm:style>
+      <a:lnRef idx="2">
+        <a:scrgbClr r="0" g="0" b="0"/>
+      </a:lnRef>
+      <a:fillRef idx="1">
+        <a:scrgbClr r="0" g="0" b="0"/>
+      </a:fillRef>
+      <a:effectRef idx="0">
+        <a:scrgbClr r="0" g="0" b="0"/>
+      </a:effectRef>
+      <a:fontRef idx="minor">
+        <a:schemeClr val="lt1"/>
+      </a:fontRef>
+    </dgm:style>
+  </dgm:styleLbl>
+  <dgm:styleLbl name="asst2">
+    <dgm:scene3d>
+      <a:camera prst="orthographicFront"/>
+      <a:lightRig rig="threePt" dir="t"/>
+    </dgm:scene3d>
+    <dgm:sp3d/>
+    <dgm:txPr/>
+    <dgm:style>
+      <a:lnRef idx="2">
+        <a:scrgbClr r="0" g="0" b="0"/>
+      </a:lnRef>
+      <a:fillRef idx="1">
+        <a:scrgbClr r="0" g="0" b="0"/>
+      </a:fillRef>
+      <a:effectRef idx="0">
+        <a:scrgbClr r="0" g="0" b="0"/>
+      </a:effectRef>
+      <a:fontRef idx="minor">
+        <a:schemeClr val="lt1"/>
+      </a:fontRef>
+    </dgm:style>
+  </dgm:styleLbl>
+  <dgm:styleLbl name="asst3">
+    <dgm:scene3d>
+      <a:camera prst="orthographicFront"/>
+      <a:lightRig rig="threePt" dir="t"/>
+    </dgm:scene3d>
+    <dgm:sp3d/>
+    <dgm:txPr/>
+    <dgm:style>
+      <a:lnRef idx="2">
+        <a:scrgbClr r="0" g="0" b="0"/>
+      </a:lnRef>
+      <a:fillRef idx="1">
+        <a:scrgbClr r="0" g="0" b="0"/>
+      </a:fillRef>
+      <a:effectRef idx="0">
+        <a:scrgbClr r="0" g="0" b="0"/>
+      </a:effectRef>
+      <a:fontRef idx="minor">
+        <a:schemeClr val="lt1"/>
+      </a:fontRef>
+    </dgm:style>
+  </dgm:styleLbl>
+  <dgm:styleLbl name="asst4">
+    <dgm:scene3d>
+      <a:camera prst="orthographicFront"/>
+      <a:lightRig rig="threePt" dir="t"/>
+    </dgm:scene3d>
+    <dgm:sp3d/>
+    <dgm:txPr/>
+    <dgm:style>
+      <a:lnRef idx="2">
+        <a:scrgbClr r="0" g="0" b="0"/>
+      </a:lnRef>
+      <a:fillRef idx="1">
+        <a:scrgbClr r="0" g="0" b="0"/>
+      </a:fillRef>
+      <a:effectRef idx="0">
+        <a:scrgbClr r="0" g="0" b="0"/>
+      </a:effectRef>
+      <a:fontRef idx="minor">
+        <a:schemeClr val="lt1"/>
+      </a:fontRef>
+    </dgm:style>
+  </dgm:styleLbl>
+  <dgm:styleLbl name="parChTrans2D1">
+    <dgm:scene3d>
+      <a:camera prst="orthographicFront"/>
+      <a:lightRig rig="threePt" dir="t"/>
+    </dgm:scene3d>
+    <dgm:sp3d/>
+    <dgm:txPr/>
+    <dgm:style>
+      <a:lnRef idx="2">
+        <a:scrgbClr r="0" g="0" b="0"/>
+      </a:lnRef>
+      <a:fillRef idx="1">
+        <a:scrgbClr r="0" g="0" b="0"/>
+      </a:fillRef>
+      <a:effectRef idx="0">
+        <a:scrgbClr r="0" g="0" b="0"/>
+      </a:effectRef>
+      <a:fontRef idx="minor">
+        <a:schemeClr val="lt1"/>
+      </a:fontRef>
+    </dgm:style>
+  </dgm:styleLbl>
+  <dgm:styleLbl name="parChTrans2D2">
+    <dgm:scene3d>
+      <a:camera prst="orthographicFront"/>
+      <a:lightRig rig="threePt" dir="t"/>
+    </dgm:scene3d>
+    <dgm:sp3d/>
+    <dgm:txPr/>
+    <dgm:style>
+      <a:lnRef idx="2">
+        <a:scrgbClr r="0" g="0" b="0"/>
+      </a:lnRef>
+      <a:fillRef idx="1">
+        <a:scrgbClr r="0" g="0" b="0"/>
+      </a:fillRef>
+      <a:effectRef idx="0">
+        <a:scrgbClr r="0" g="0" b="0"/>
+      </a:effectRef>
+      <a:fontRef idx="minor">
+        <a:schemeClr val="lt1"/>
+      </a:fontRef>
+    </dgm:style>
+  </dgm:styleLbl>
+  <dgm:styleLbl name="parChTrans2D3">
+    <dgm:scene3d>
+      <a:camera prst="orthographicFront"/>
+      <a:lightRig rig="threePt" dir="t"/>
+    </dgm:scene3d>
+    <dgm:sp3d/>
+    <dgm:txPr/>
+    <dgm:style>
+      <a:lnRef idx="2">
+        <a:scrgbClr r="0" g="0" b="0"/>
+      </a:lnRef>
+      <a:fillRef idx="1">
+        <a:scrgbClr r="0" g="0" b="0"/>
+      </a:fillRef>
+      <a:effectRef idx="0">
+        <a:scrgbClr r="0" g="0" b="0"/>
+      </a:effectRef>
+      <a:fontRef idx="minor">
+        <a:schemeClr val="lt1"/>
+      </a:fontRef>
+    </dgm:style>
+  </dgm:styleLbl>
+  <dgm:styleLbl name="parChTrans2D4">
+    <dgm:scene3d>
+      <a:camera prst="orthographicFront"/>
+      <a:lightRig rig="threePt" dir="t"/>
+    </dgm:scene3d>
+    <dgm:sp3d/>
+    <dgm:txPr/>
+    <dgm:style>
+      <a:lnRef idx="2">
+        <a:scrgbClr r="0" g="0" b="0"/>
+      </a:lnRef>
+      <a:fillRef idx="1">
+        <a:scrgbClr r="0" g="0" b="0"/>
+      </a:fillRef>
+      <a:effectRef idx="0">
+        <a:scrgbClr r="0" g="0" b="0"/>
+      </a:effectRef>
+      <a:fontRef idx="minor">
+        <a:schemeClr val="lt1"/>
+      </a:fontRef>
+    </dgm:style>
+  </dgm:styleLbl>
+  <dgm:styleLbl name="parChTrans1D1">
+    <dgm:scene3d>
+      <a:camera prst="orthographicFront"/>
+      <a:lightRig rig="threePt" dir="t"/>
+    </dgm:scene3d>
+    <dgm:sp3d/>
+    <dgm:txPr/>
+    <dgm:style>
+      <a:lnRef idx="2">
+        <a:scrgbClr r="0" g="0" b="0"/>
+      </a:lnRef>
+      <a:fillRef idx="0">
+        <a:scrgbClr r="0" g="0" b="0"/>
+      </a:fillRef>
+      <a:effectRef idx="0">
+        <a:scrgbClr r="0" g="0" b="0"/>
+      </a:effectRef>
+      <a:fontRef idx="minor"/>
+    </dgm:style>
+  </dgm:styleLbl>
+  <dgm:styleLbl name="parChTrans1D2">
+    <dgm:scene3d>
+      <a:camera prst="orthographicFront"/>
+      <a:lightRig rig="threePt" dir="t"/>
+    </dgm:scene3d>
+    <dgm:sp3d/>
+    <dgm:txPr/>
+    <dgm:style>
+      <a:lnRef idx="2">
+        <a:scrgbClr r="0" g="0" b="0"/>
+      </a:lnRef>
+      <a:fillRef idx="0">
+        <a:scrgbClr r="0" g="0" b="0"/>
+      </a:fillRef>
+      <a:effectRef idx="0">
+        <a:scrgbClr r="0" g="0" b="0"/>
+      </a:effectRef>
+      <a:fontRef idx="minor"/>
+    </dgm:style>
+  </dgm:styleLbl>
+  <dgm:styleLbl name="parChTrans1D3">
+    <dgm:scene3d>
+      <a:camera prst="orthographicFront"/>
+      <a:lightRig rig="threePt" dir="t"/>
+    </dgm:scene3d>
+    <dgm:sp3d/>
+    <dgm:txPr/>
+    <dgm:style>
+      <a:lnRef idx="2">
+        <a:scrgbClr r="0" g="0" b="0"/>
+      </a:lnRef>
+      <a:fillRef idx="0">
+        <a:scrgbClr r="0" g="0" b="0"/>
+      </a:fillRef>
+      <a:effectRef idx="0">
+        <a:scrgbClr r="0" g="0" b="0"/>
+      </a:effectRef>
+      <a:fontRef idx="minor"/>
+    </dgm:style>
+  </dgm:styleLbl>
+  <dgm:styleLbl name="parChTrans1D4">
+    <dgm:scene3d>
+      <a:camera prst="orthographicFront"/>
+      <a:lightRig rig="threePt" dir="t"/>
+    </dgm:scene3d>
+    <dgm:sp3d/>
+    <dgm:txPr/>
+    <dgm:style>
+      <a:lnRef idx="2">
+        <a:scrgbClr r="0" g="0" b="0"/>
+      </a:lnRef>
+      <a:fillRef idx="0">
+        <a:scrgbClr r="0" g="0" b="0"/>
+      </a:fillRef>
+      <a:effectRef idx="0">
+        <a:scrgbClr r="0" g="0" b="0"/>
+      </a:effectRef>
+      <a:fontRef idx="minor"/>
+    </dgm:style>
+  </dgm:styleLbl>
+  <dgm:styleLbl name="fgAcc1">
+    <dgm:scene3d>
+      <a:camera prst="orthographicFront"/>
+      <a:lightRig rig="threePt" dir="t"/>
+    </dgm:scene3d>
+    <dgm:sp3d/>
+    <dgm:txPr/>
+    <dgm:style>
+      <a:lnRef idx="2">
+        <a:scrgbClr r="0" g="0" b="0"/>
+      </a:lnRef>
+      <a:fillRef idx="1">
+        <a:scrgbClr r="0" g="0" b="0"/>
+      </a:fillRef>
+      <a:effectRef idx="0">
+        <a:scrgbClr r="0" g="0" b="0"/>
+      </a:effectRef>
+      <a:fontRef idx="minor"/>
+    </dgm:style>
+  </dgm:styleLbl>
+  <dgm:styleLbl name="conFgAcc1">
+    <dgm:scene3d>
+      <a:camera prst="orthographicFront"/>
+      <a:lightRig rig="threePt" dir="t"/>
+    </dgm:scene3d>
+    <dgm:sp3d/>
+    <dgm:txPr/>
+    <dgm:style>
+      <a:lnRef idx="2">
+        <a:scrgbClr r="0" g="0" b="0"/>
+      </a:lnRef>
+      <a:fillRef idx="1">
+        <a:scrgbClr r="0" g="0" b="0"/>
+      </a:fillRef>
+      <a:effectRef idx="0">
+        <a:scrgbClr r="0" g="0" b="0"/>
+      </a:effectRef>
+      <a:fontRef idx="minor"/>
+    </dgm:style>
+  </dgm:styleLbl>
+  <dgm:styleLbl name="alignAcc1">
+    <dgm:scene3d>
+      <a:camera prst="orthographicFront"/>
+      <a:lightRig rig="threePt" dir="t"/>
+    </dgm:scene3d>
+    <dgm:sp3d/>
+    <dgm:txPr/>
+    <dgm:style>
+      <a:lnRef idx="2">
+        <a:scrgbClr r="0" g="0" b="0"/>
+      </a:lnRef>
+      <a:fillRef idx="1">
+        <a:scrgbClr r="0" g="0" b="0"/>
+      </a:fillRef>
+      <a:effectRef idx="0">
+        <a:scrgbClr r="0" g="0" b="0"/>
+      </a:effectRef>
+      <a:fontRef idx="minor"/>
+    </dgm:style>
+  </dgm:styleLbl>
+  <dgm:styleLbl name="trAlignAcc1">
+    <dgm:scene3d>
+      <a:camera prst="orthographicFront"/>
+      <a:lightRig rig="threePt" dir="t"/>
+    </dgm:scene3d>
+    <dgm:sp3d/>
+    <dgm:txPr/>
+    <dgm:style>
+      <a:lnRef idx="1">
+        <a:scrgbClr r="0" g="0" b="0"/>
+      </a:lnRef>
+      <a:fillRef idx="1">
+        <a:scrgbClr r="0" g="0" b="0"/>
+      </a:fillRef>
+      <a:effectRef idx="0">
+        <a:scrgbClr r="0" g="0" b="0"/>
+      </a:effectRef>
+      <a:fontRef idx="minor"/>
+    </dgm:style>
+  </dgm:styleLbl>
+  <dgm:styleLbl name="bgAcc1">
+    <dgm:scene3d>
+      <a:camera prst="orthographicFront"/>
+      <a:lightRig rig="threePt" dir="t"/>
+    </dgm:scene3d>
+    <dgm:sp3d/>
+    <dgm:txPr/>
+    <dgm:style>
+      <a:lnRef idx="2">
+        <a:scrgbClr r="0" g="0" b="0"/>
+      </a:lnRef>
+      <a:fillRef idx="1">
+        <a:scrgbClr r="0" g="0" b="0"/>
+      </a:fillRef>
+      <a:effectRef idx="0">
+        <a:scrgbClr r="0" g="0" b="0"/>
+      </a:effectRef>
+      <a:fontRef idx="minor"/>
+    </dgm:style>
+  </dgm:styleLbl>
+  <dgm:styleLbl name="solidFgAcc1">
+    <dgm:scene3d>
+      <a:camera prst="orthographicFront"/>
+      <a:lightRig rig="threePt" dir="t"/>
+    </dgm:scene3d>
+    <dgm:sp3d/>
+    <dgm:txPr/>
+    <dgm:style>
+      <a:lnRef idx="2">
+        <a:scrgbClr r="0" g="0" b="0"/>
+      </a:lnRef>
+      <a:fillRef idx="1">
+        <a:scrgbClr r="0" g="0" b="0"/>
+      </a:fillRef>
+      <a:effectRef idx="0">
+        <a:scrgbClr r="0" g="0" b="0"/>
+      </a:effectRef>
+      <a:fontRef idx="minor"/>
+    </dgm:style>
+  </dgm:styleLbl>
+  <dgm:styleLbl name="solidAlignAcc1">
+    <dgm:scene3d>
+      <a:camera prst="orthographicFront"/>
+      <a:lightRig rig="threePt" dir="t"/>
+    </dgm:scene3d>
+    <dgm:sp3d/>
+    <dgm:txPr/>
+    <dgm:style>
+      <a:lnRef idx="2">
+        <a:scrgbClr r="0" g="0" b="0"/>
+      </a:lnRef>
+      <a:fillRef idx="1">
+        <a:scrgbClr r="0" g="0" b="0"/>
+      </a:fillRef>
+      <a:effectRef idx="0">
+        <a:scrgbClr r="0" g="0" b="0"/>
+      </a:effectRef>
+      <a:fontRef idx="minor"/>
+    </dgm:style>
+  </dgm:styleLbl>
+  <dgm:styleLbl name="solidBgAcc1">
+    <dgm:scene3d>
+      <a:camera prst="orthographicFront"/>
+      <a:lightRig rig="threePt" dir="t"/>
+    </dgm:scene3d>
+    <dgm:sp3d/>
+    <dgm:txPr/>
+    <dgm:style>
+      <a:lnRef idx="2">
+        <a:scrgbClr r="0" g="0" b="0"/>
+      </a:lnRef>
+      <a:fillRef idx="1">
+        <a:scrgbClr r="0" g="0" b="0"/>
+      </a:fillRef>
+      <a:effectRef idx="0">
+        <a:scrgbClr r="0" g="0" b="0"/>
+      </a:effectRef>
+      <a:fontRef idx="minor"/>
+    </dgm:style>
+  </dgm:styleLbl>
+  <dgm:styleLbl name="fgAccFollowNode1">
+    <dgm:scene3d>
+      <a:camera prst="orthographicFront"/>
+      <a:lightRig rig="threePt" dir="t"/>
+    </dgm:scene3d>
+    <dgm:sp3d/>
+    <dgm:txPr/>
+    <dgm:style>
+      <a:lnRef idx="2">
+        <a:scrgbClr r="0" g="0" b="0"/>
+      </a:lnRef>
+      <a:fillRef idx="1">
+        <a:scrgbClr r="0" g="0" b="0"/>
+      </a:fillRef>
+      <a:effectRef idx="0">
+        <a:scrgbClr r="0" g="0" b="0"/>
+      </a:effectRef>
+      <a:fontRef idx="minor"/>
+    </dgm:style>
+  </dgm:styleLbl>
+  <dgm:styleLbl name="alignAccFollowNode1">
+    <dgm:scene3d>
+      <a:camera prst="orthographicFront"/>
+      <a:lightRig rig="threePt" dir="t"/>
+    </dgm:scene3d>
+    <dgm:sp3d/>
+    <dgm:txPr/>
+    <dgm:style>
+      <a:lnRef idx="2">
+        <a:scrgbClr r="0" g="0" b="0"/>
+      </a:lnRef>
+      <a:fillRef idx="1">
+        <a:scrgbClr r="0" g="0" b="0"/>
+      </a:fillRef>
+      <a:effectRef idx="0">
+        <a:scrgbClr r="0" g="0" b="0"/>
+      </a:effectRef>
+      <a:fontRef idx="minor"/>
+    </dgm:style>
+  </dgm:styleLbl>
+  <dgm:styleLbl name="bgAccFollowNode1">
+    <dgm:scene3d>
+      <a:camera prst="orthographicFront"/>
+      <a:lightRig rig="threePt" dir="t"/>
+    </dgm:scene3d>
+    <dgm:sp3d/>
+    <dgm:txPr/>
+    <dgm:style>
+      <a:lnRef idx="2">
+        <a:scrgbClr r="0" g="0" b="0"/>
+      </a:lnRef>
+      <a:fillRef idx="1">
+        <a:scrgbClr r="0" g="0" b="0"/>
+      </a:fillRef>
+      <a:effectRef idx="0">
+        <a:scrgbClr r="0" g="0" b="0"/>
+      </a:effectRef>
+      <a:fontRef idx="minor"/>
+    </dgm:style>
+  </dgm:styleLbl>
+  <dgm:styleLbl name="fgAcc0">
+    <dgm:scene3d>
+      <a:camera prst="orthographicFront"/>
+      <a:lightRig rig="threePt" dir="t"/>
+    </dgm:scene3d>
+    <dgm:sp3d/>
+    <dgm:txPr/>
+    <dgm:style>
+      <a:lnRef idx="2">
+        <a:scrgbClr r="0" g="0" b="0"/>
+      </a:lnRef>
+      <a:fillRef idx="1">
+        <a:scrgbClr r="0" g="0" b="0"/>
+      </a:fillRef>
+      <a:effectRef idx="0">
+        <a:scrgbClr r="0" g="0" b="0"/>
+      </a:effectRef>
+      <a:fontRef idx="minor"/>
+    </dgm:style>
+  </dgm:styleLbl>
+  <dgm:styleLbl name="fgAcc2">
+    <dgm:scene3d>
+      <a:camera prst="orthographicFront"/>
+      <a:lightRig rig="threePt" dir="t"/>
+    </dgm:scene3d>
+    <dgm:sp3d/>
+    <dgm:txPr/>
+    <dgm:style>
+      <a:lnRef idx="2">
+        <a:scrgbClr r="0" g="0" b="0"/>
+      </a:lnRef>
+      <a:fillRef idx="1">
+        <a:scrgbClr r="0" g="0" b="0"/>
+      </a:fillRef>
+      <a:effectRef idx="0">
+        <a:scrgbClr r="0" g="0" b="0"/>
+      </a:effectRef>
+      <a:fontRef idx="minor"/>
+    </dgm:style>
+  </dgm:styleLbl>
+  <dgm:styleLbl name="fgAcc3">
+    <dgm:scene3d>
+      <a:camera prst="orthographicFront"/>
+      <a:lightRig rig="threePt" dir="t"/>
+    </dgm:scene3d>
+    <dgm:sp3d/>
+    <dgm:txPr/>
+    <dgm:style>
+      <a:lnRef idx="2">
+        <a:scrgbClr r="0" g="0" b="0"/>
+      </a:lnRef>
+      <a:fillRef idx="1">
+        <a:scrgbClr r="0" g="0" b="0"/>
+      </a:fillRef>
+      <a:effectRef idx="0">
+        <a:scrgbClr r="0" g="0" b="0"/>
+      </a:effectRef>
+      <a:fontRef idx="minor"/>
+    </dgm:style>
+  </dgm:styleLbl>
+  <dgm:styleLbl name="fgAcc4">
+    <dgm:scene3d>
+      <a:camera prst="orthographicFront"/>
+      <a:lightRig rig="threePt" dir="t"/>
+    </dgm:scene3d>
+    <dgm:sp3d/>
+    <dgm:txPr/>
+    <dgm:style>
+      <a:lnRef idx="2">
+        <a:scrgbClr r="0" g="0" b="0"/>
+      </a:lnRef>
+      <a:fillRef idx="1">
+        <a:scrgbClr r="0" g="0" b="0"/>
+      </a:fillRef>
+      <a:effectRef idx="0">
+        <a:scrgbClr r="0" g="0" b="0"/>
+      </a:effectRef>
+      <a:fontRef idx="minor"/>
+    </dgm:style>
+  </dgm:styleLbl>
+  <dgm:styleLbl name="bgShp">
+    <dgm:scene3d>
+      <a:camera prst="orthographicFront"/>
+      <a:lightRig rig="threePt" dir="t"/>
+    </dgm:scene3d>
+    <dgm:sp3d/>
+    <dgm:txPr/>
+    <dgm:style>
+      <a:lnRef idx="0">
+        <a:scrgbClr r="0" g="0" b="0"/>
+      </a:lnRef>
+      <a:fillRef idx="1">
+        <a:scrgbClr r="0" g="0" b="0"/>
+      </a:fillRef>
+      <a:effectRef idx="0">
+        <a:scrgbClr r="0" g="0" b="0"/>
+      </a:effectRef>
+      <a:fontRef idx="minor"/>
+    </dgm:style>
+  </dgm:styleLbl>
+  <dgm:styleLbl name="dkBgShp">
+    <dgm:scene3d>
+      <a:camera prst="orthographicFront"/>
+      <a:lightRig rig="threePt" dir="t"/>
+    </dgm:scene3d>
+    <dgm:sp3d/>
+    <dgm:txPr/>
+    <dgm:style>
+      <a:lnRef idx="0">
+        <a:scrgbClr r="0" g="0" b="0"/>
+      </a:lnRef>
+      <a:fillRef idx="1">
+        <a:scrgbClr r="0" g="0" b="0"/>
+      </a:fillRef>
+      <a:effectRef idx="0">
+        <a:scrgbClr r="0" g="0" b="0"/>
+      </a:effectRef>
+      <a:fontRef idx="minor"/>
+    </dgm:style>
+  </dgm:styleLbl>
+  <dgm:styleLbl name="trBgShp">
+    <dgm:scene3d>
+      <a:camera prst="orthographicFront"/>
+      <a:lightRig rig="threePt" dir="t"/>
+    </dgm:scene3d>
+    <dgm:sp3d/>
+    <dgm:txPr/>
+    <dgm:style>
+      <a:lnRef idx="0">
+        <a:scrgbClr r="0" g="0" b="0"/>
+      </a:lnRef>
+      <a:fillRef idx="1">
+        <a:scrgbClr r="0" g="0" b="0"/>
+      </a:fillRef>
+      <a:effectRef idx="0">
+        <a:scrgbClr r="0" g="0" b="0"/>
+      </a:effectRef>
+      <a:fontRef idx="minor"/>
+    </dgm:style>
+  </dgm:styleLbl>
+  <dgm:styleLbl name="fgShp">
+    <dgm:scene3d>
+      <a:camera prst="orthographicFront"/>
+      <a:lightRig rig="threePt" dir="t"/>
+    </dgm:scene3d>
+    <dgm:sp3d/>
+    <dgm:txPr/>
+    <dgm:style>
+      <a:lnRef idx="2">
+        <a:scrgbClr r="0" g="0" b="0"/>
+      </a:lnRef>
+      <a:fillRef idx="1">
+        <a:scrgbClr r="0" g="0" b="0"/>
+      </a:fillRef>
+      <a:effectRef idx="0">
+        <a:scrgbClr r="0" g="0" b="0"/>
+      </a:effectRef>
+      <a:fontRef idx="minor"/>
+    </dgm:style>
+  </dgm:styleLbl>
+  <dgm:styleLbl name="revTx">
+    <dgm:scene3d>
+      <a:camera prst="orthographicFront"/>
+      <a:lightRig rig="threePt" dir="t"/>
+    </dgm:scene3d>
+    <dgm:sp3d/>
+    <dgm:txPr/>
+    <dgm:style>
+      <a:lnRef idx="0">
+        <a:scrgbClr r="0" g="0" b="0"/>
+      </a:lnRef>
+      <a:fillRef idx="0">
+        <a:scrgbClr r="0" g="0" b="0"/>
+      </a:fillRef>
+      <a:effectRef idx="0">
+        <a:scrgbClr r="0" g="0" b="0"/>
+      </a:effectRef>
+      <a:fontRef idx="minor"/>
+    </dgm:style>
+  </dgm:styleLbl>
+</dgm:styleDef>
+</file>
+
 <file path=ppt/slideLayouts/slideLayout1.xml><?xml version="1.0" encoding="utf-8"?>
 <p:sldLayout xmlns:a="http://schemas.openxmlformats.org/drawingml/2006/main" xmlns:r="http://schemas.openxmlformats.org/officeDocument/2006/relationships" xmlns:p="http://schemas.openxmlformats.org/presentationml/2006/main" type="title" preserve="1">
   <p:cSld name="Title Slide">
@@ -348,7 +3520,7 @@
           <a:p>
             <a:fld id="{C14A4EDE-A1FD-6F4D-B973-0317A1D48AB8}" type="datetimeFigureOut">
               <a:rPr lang="en-US" smtClean="0"/>
-              <a:t>10/19/2019</a:t>
+              <a:t>10/20/2019</a:t>
             </a:fld>
             <a:endParaRPr lang="en-US"/>
           </a:p>
@@ -682,7 +3854,7 @@
           <a:p>
             <a:fld id="{C14A4EDE-A1FD-6F4D-B973-0317A1D48AB8}" type="datetimeFigureOut">
               <a:rPr lang="en-US" smtClean="0"/>
-              <a:t>10/19/2019</a:t>
+              <a:t>10/20/2019</a:t>
             </a:fld>
             <a:endParaRPr lang="en-US"/>
           </a:p>
@@ -960,7 +4132,7 @@
           <a:p>
             <a:fld id="{C14A4EDE-A1FD-6F4D-B973-0317A1D48AB8}" type="datetimeFigureOut">
               <a:rPr lang="en-US" smtClean="0"/>
-              <a:t>10/19/2019</a:t>
+              <a:t>10/20/2019</a:t>
             </a:fld>
             <a:endParaRPr lang="en-US"/>
           </a:p>
@@ -1528,7 +4700,7 @@
           <a:p>
             <a:fld id="{C14A4EDE-A1FD-6F4D-B973-0317A1D48AB8}" type="datetimeFigureOut">
               <a:rPr lang="en-US" smtClean="0"/>
-              <a:t>10/19/2019</a:t>
+              <a:t>10/20/2019</a:t>
             </a:fld>
             <a:endParaRPr lang="en-US"/>
           </a:p>
@@ -1806,7 +4978,7 @@
           <a:p>
             <a:fld id="{C14A4EDE-A1FD-6F4D-B973-0317A1D48AB8}" type="datetimeFigureOut">
               <a:rPr lang="en-US" smtClean="0"/>
-              <a:t>10/19/2019</a:t>
+              <a:t>10/20/2019</a:t>
             </a:fld>
             <a:endParaRPr lang="en-US"/>
           </a:p>
@@ -2368,7 +5540,7 @@
           <a:p>
             <a:fld id="{C14A4EDE-A1FD-6F4D-B973-0317A1D48AB8}" type="datetimeFigureOut">
               <a:rPr lang="en-US" smtClean="0"/>
-              <a:t>10/19/2019</a:t>
+              <a:t>10/20/2019</a:t>
             </a:fld>
             <a:endParaRPr lang="en-US"/>
           </a:p>
@@ -2695,7 +5867,7 @@
           <a:p>
             <a:fld id="{C14A4EDE-A1FD-6F4D-B973-0317A1D48AB8}" type="datetimeFigureOut">
               <a:rPr lang="en-US" smtClean="0"/>
-              <a:t>10/19/2019</a:t>
+              <a:t>10/20/2019</a:t>
             </a:fld>
             <a:endParaRPr lang="en-US"/>
           </a:p>
@@ -2900,7 +6072,7 @@
           <a:p>
             <a:fld id="{C14A4EDE-A1FD-6F4D-B973-0317A1D48AB8}" type="datetimeFigureOut">
               <a:rPr lang="en-US" smtClean="0"/>
-              <a:t>10/19/2019</a:t>
+              <a:t>10/20/2019</a:t>
             </a:fld>
             <a:endParaRPr lang="en-US"/>
           </a:p>
@@ -3110,7 +6282,7 @@
           <a:p>
             <a:fld id="{C14A4EDE-A1FD-6F4D-B973-0317A1D48AB8}" type="datetimeFigureOut">
               <a:rPr lang="en-US" smtClean="0"/>
-              <a:t>10/19/2019</a:t>
+              <a:t>10/20/2019</a:t>
             </a:fld>
             <a:endParaRPr lang="en-US"/>
           </a:p>
@@ -3310,7 +6482,7 @@
           <a:p>
             <a:fld id="{C14A4EDE-A1FD-6F4D-B973-0317A1D48AB8}" type="datetimeFigureOut">
               <a:rPr lang="en-US" smtClean="0"/>
-              <a:t>10/19/2019</a:t>
+              <a:t>10/20/2019</a:t>
             </a:fld>
             <a:endParaRPr lang="en-US"/>
           </a:p>
@@ -3586,7 +6758,7 @@
           <a:p>
             <a:fld id="{C14A4EDE-A1FD-6F4D-B973-0317A1D48AB8}" type="datetimeFigureOut">
               <a:rPr lang="en-US" smtClean="0"/>
-              <a:t>10/19/2019</a:t>
+              <a:t>10/20/2019</a:t>
             </a:fld>
             <a:endParaRPr lang="en-US"/>
           </a:p>
@@ -3852,7 +7024,7 @@
           <a:p>
             <a:fld id="{C14A4EDE-A1FD-6F4D-B973-0317A1D48AB8}" type="datetimeFigureOut">
               <a:rPr lang="en-US" smtClean="0"/>
-              <a:t>10/19/2019</a:t>
+              <a:t>10/20/2019</a:t>
             </a:fld>
             <a:endParaRPr lang="en-US"/>
           </a:p>
@@ -4226,7 +7398,7 @@
           <a:p>
             <a:fld id="{C14A4EDE-A1FD-6F4D-B973-0317A1D48AB8}" type="datetimeFigureOut">
               <a:rPr lang="en-US" smtClean="0"/>
-              <a:t>10/19/2019</a:t>
+              <a:t>10/20/2019</a:t>
             </a:fld>
             <a:endParaRPr lang="en-US"/>
           </a:p>
@@ -4374,7 +7546,7 @@
           <a:p>
             <a:fld id="{C14A4EDE-A1FD-6F4D-B973-0317A1D48AB8}" type="datetimeFigureOut">
               <a:rPr lang="en-US" smtClean="0"/>
-              <a:t>10/19/2019</a:t>
+              <a:t>10/20/2019</a:t>
             </a:fld>
             <a:endParaRPr lang="en-US"/>
           </a:p>
@@ -4499,7 +7671,7 @@
           <a:p>
             <a:fld id="{C14A4EDE-A1FD-6F4D-B973-0317A1D48AB8}" type="datetimeFigureOut">
               <a:rPr lang="en-US" smtClean="0"/>
-              <a:t>10/19/2019</a:t>
+              <a:t>10/20/2019</a:t>
             </a:fld>
             <a:endParaRPr lang="en-US"/>
           </a:p>
@@ -4784,7 +7956,7 @@
           <a:p>
             <a:fld id="{C14A4EDE-A1FD-6F4D-B973-0317A1D48AB8}" type="datetimeFigureOut">
               <a:rPr lang="en-US" smtClean="0"/>
-              <a:t>10/19/2019</a:t>
+              <a:t>10/20/2019</a:t>
             </a:fld>
             <a:endParaRPr lang="en-US"/>
           </a:p>
@@ -5108,7 +8280,7 @@
           <a:p>
             <a:fld id="{C14A4EDE-A1FD-6F4D-B973-0317A1D48AB8}" type="datetimeFigureOut">
               <a:rPr lang="en-US" smtClean="0"/>
-              <a:t>10/19/2019</a:t>
+              <a:t>10/20/2019</a:t>
             </a:fld>
             <a:endParaRPr lang="en-US"/>
           </a:p>
@@ -5340,7 +8512,7 @@
           <a:p>
             <a:fld id="{C14A4EDE-A1FD-6F4D-B973-0317A1D48AB8}" type="datetimeFigureOut">
               <a:rPr lang="en-US" smtClean="0"/>
-              <a:t>10/19/2019</a:t>
+              <a:t>10/20/2019</a:t>
             </a:fld>
             <a:endParaRPr lang="en-US"/>
           </a:p>
@@ -6064,7 +9236,7 @@
           <a:p>
             <a:r>
               <a:rPr lang="en-US" dirty="0"/>
-              <a:t>Dashboard</a:t>
+              <a:t>Coding for Model</a:t>
             </a:r>
           </a:p>
         </p:txBody>
@@ -6074,7 +9246,7 @@
           <p:cNvPr id="4" name="TextBox 3">
             <a:extLst>
               <a:ext uri="{FF2B5EF4-FFF2-40B4-BE49-F238E27FC236}">
-                <a16:creationId xmlns:a16="http://schemas.microsoft.com/office/drawing/2014/main" id="{A25F184E-8D13-474C-965D-789EFAFE76FE}"/>
+                <a16:creationId xmlns:a16="http://schemas.microsoft.com/office/drawing/2014/main" id="{7D71584C-C8FB-FE4F-AC8F-7C28ED2B2892}"/>
               </a:ext>
             </a:extLst>
           </p:cNvPr>
@@ -6104,7 +9276,7 @@
             <a:pPr algn="ctr"/>
             <a:r>
               <a:rPr lang="en-US" b="1" dirty="0"/>
-              <a:t>All</a:t>
+              <a:t>???</a:t>
             </a:r>
           </a:p>
         </p:txBody>
@@ -6112,7 +9284,7 @@
     </p:spTree>
     <p:extLst>
       <p:ext uri="{BB962C8B-B14F-4D97-AF65-F5344CB8AC3E}">
-        <p14:creationId xmlns:p14="http://schemas.microsoft.com/office/powerpoint/2010/main" val="3437850744"/>
+        <p14:creationId xmlns:p14="http://schemas.microsoft.com/office/powerpoint/2010/main" val="2020585456"/>
       </p:ext>
     </p:extLst>
   </p:cSld>
@@ -6154,7 +9326,7 @@
         <p:spPr>
           <a:xfrm>
             <a:off x="1058238" y="678094"/>
-            <a:ext cx="3606229" cy="1200329"/>
+            <a:ext cx="3606229" cy="369332"/>
           </a:xfrm>
           <a:prstGeom prst="rect">
             <a:avLst/>
@@ -6169,20 +9341,8 @@
           <a:p>
             <a:r>
               <a:rPr lang="en-US" dirty="0"/>
-              <a:t>Hypothesis</a:t>
-            </a:r>
-          </a:p>
-          <a:p>
-            <a:endParaRPr lang="en-US" dirty="0"/>
-          </a:p>
-          <a:p>
-            <a:r>
-              <a:rPr lang="en-US" dirty="0"/>
-              <a:t>Conclusion</a:t>
-            </a:r>
-          </a:p>
-          <a:p>
-            <a:endParaRPr lang="en-US" dirty="0"/>
+              <a:t>Dashboard</a:t>
+            </a:r>
           </a:p>
         </p:txBody>
       </p:sp>
@@ -6191,7 +9351,7 @@
           <p:cNvPr id="4" name="TextBox 3">
             <a:extLst>
               <a:ext uri="{FF2B5EF4-FFF2-40B4-BE49-F238E27FC236}">
-                <a16:creationId xmlns:a16="http://schemas.microsoft.com/office/drawing/2014/main" id="{D1845CE9-B618-7E47-B6E6-35431F741F0F}"/>
+                <a16:creationId xmlns:a16="http://schemas.microsoft.com/office/drawing/2014/main" id="{A25F184E-8D13-474C-965D-789EFAFE76FE}"/>
               </a:ext>
             </a:extLst>
           </p:cNvPr>
@@ -6200,8 +9360,8 @@
         </p:nvSpPr>
         <p:spPr>
           <a:xfrm>
-            <a:off x="9613557" y="98854"/>
-            <a:ext cx="2298357" cy="369332"/>
+            <a:off x="10602098" y="98854"/>
+            <a:ext cx="1309816" cy="369332"/>
           </a:xfrm>
           <a:prstGeom prst="rect">
             <a:avLst/>
@@ -6221,7 +9381,7 @@
             <a:pPr algn="ctr"/>
             <a:r>
               <a:rPr lang="en-US" b="1" dirty="0"/>
-              <a:t>All – but one slide</a:t>
+              <a:t>All</a:t>
             </a:r>
           </a:p>
         </p:txBody>
@@ -6229,7 +9389,7 @@
     </p:spTree>
     <p:extLst>
       <p:ext uri="{BB962C8B-B14F-4D97-AF65-F5344CB8AC3E}">
-        <p14:creationId xmlns:p14="http://schemas.microsoft.com/office/powerpoint/2010/main" val="1923034612"/>
+        <p14:creationId xmlns:p14="http://schemas.microsoft.com/office/powerpoint/2010/main" val="3437850744"/>
       </p:ext>
     </p:extLst>
   </p:cSld>
@@ -6286,6 +9446,123 @@
           <a:p>
             <a:r>
               <a:rPr lang="en-US" dirty="0"/>
+              <a:t>Hypothesis</a:t>
+            </a:r>
+          </a:p>
+          <a:p>
+            <a:endParaRPr lang="en-US" dirty="0"/>
+          </a:p>
+          <a:p>
+            <a:r>
+              <a:rPr lang="en-US" dirty="0"/>
+              <a:t>Conclusion</a:t>
+            </a:r>
+          </a:p>
+          <a:p>
+            <a:endParaRPr lang="en-US" dirty="0"/>
+          </a:p>
+        </p:txBody>
+      </p:sp>
+      <p:sp>
+        <p:nvSpPr>
+          <p:cNvPr id="4" name="TextBox 3">
+            <a:extLst>
+              <a:ext uri="{FF2B5EF4-FFF2-40B4-BE49-F238E27FC236}">
+                <a16:creationId xmlns:a16="http://schemas.microsoft.com/office/drawing/2014/main" id="{D1845CE9-B618-7E47-B6E6-35431F741F0F}"/>
+              </a:ext>
+            </a:extLst>
+          </p:cNvPr>
+          <p:cNvSpPr txBox="1"/>
+          <p:nvPr/>
+        </p:nvSpPr>
+        <p:spPr>
+          <a:xfrm>
+            <a:off x="9613557" y="98854"/>
+            <a:ext cx="2298357" cy="369332"/>
+          </a:xfrm>
+          <a:prstGeom prst="rect">
+            <a:avLst/>
+          </a:prstGeom>
+          <a:solidFill>
+            <a:schemeClr val="accent2">
+              <a:lumMod val="50000"/>
+            </a:schemeClr>
+          </a:solidFill>
+        </p:spPr>
+        <p:txBody>
+          <a:bodyPr wrap="square" rtlCol="0">
+            <a:spAutoFit/>
+          </a:bodyPr>
+          <a:lstStyle/>
+          <a:p>
+            <a:pPr algn="ctr"/>
+            <a:r>
+              <a:rPr lang="en-US" b="1" dirty="0"/>
+              <a:t>All – but one slide</a:t>
+            </a:r>
+          </a:p>
+        </p:txBody>
+      </p:sp>
+    </p:spTree>
+    <p:extLst>
+      <p:ext uri="{BB962C8B-B14F-4D97-AF65-F5344CB8AC3E}">
+        <p14:creationId xmlns:p14="http://schemas.microsoft.com/office/powerpoint/2010/main" val="1923034612"/>
+      </p:ext>
+    </p:extLst>
+  </p:cSld>
+  <p:clrMapOvr>
+    <a:masterClrMapping/>
+  </p:clrMapOvr>
+</p:sld>
+</file>
+
+<file path=ppt/slides/slide13.xml><?xml version="1.0" encoding="utf-8"?>
+<p:sld xmlns:a="http://schemas.openxmlformats.org/drawingml/2006/main" xmlns:r="http://schemas.openxmlformats.org/officeDocument/2006/relationships" xmlns:p="http://schemas.openxmlformats.org/presentationml/2006/main">
+  <p:cSld>
+    <p:spTree>
+      <p:nvGrpSpPr>
+        <p:cNvPr id="1" name=""/>
+        <p:cNvGrpSpPr/>
+        <p:nvPr/>
+      </p:nvGrpSpPr>
+      <p:grpSpPr>
+        <a:xfrm>
+          <a:off x="0" y="0"/>
+          <a:ext cx="0" cy="0"/>
+          <a:chOff x="0" y="0"/>
+          <a:chExt cx="0" cy="0"/>
+        </a:xfrm>
+      </p:grpSpPr>
+      <p:sp>
+        <p:nvSpPr>
+          <p:cNvPr id="3" name="TextBox 2">
+            <a:extLst>
+              <a:ext uri="{FF2B5EF4-FFF2-40B4-BE49-F238E27FC236}">
+                <a16:creationId xmlns:a16="http://schemas.microsoft.com/office/drawing/2014/main" id="{E03A1BD5-672E-374E-9E30-401EB3C688D1}"/>
+              </a:ext>
+            </a:extLst>
+          </p:cNvPr>
+          <p:cNvSpPr txBox="1"/>
+          <p:nvPr/>
+        </p:nvSpPr>
+        <p:spPr>
+          <a:xfrm>
+            <a:off x="1058238" y="678094"/>
+            <a:ext cx="3606229" cy="1200329"/>
+          </a:xfrm>
+          <a:prstGeom prst="rect">
+            <a:avLst/>
+          </a:prstGeom>
+          <a:noFill/>
+        </p:spPr>
+        <p:txBody>
+          <a:bodyPr wrap="square" rtlCol="0">
+            <a:spAutoFit/>
+          </a:bodyPr>
+          <a:lstStyle/>
+          <a:p>
+            <a:r>
+              <a:rPr lang="en-US" dirty="0"/>
               <a:t>Limitations</a:t>
             </a:r>
           </a:p>
@@ -6356,7 +9633,7 @@
 </p:sld>
 </file>
 
-<file path=ppt/slides/slide13.xml><?xml version="1.0" encoding="utf-8"?>
+<file path=ppt/slides/slide14.xml><?xml version="1.0" encoding="utf-8"?>
 <p:sld xmlns:a="http://schemas.openxmlformats.org/drawingml/2006/main" xmlns:r="http://schemas.openxmlformats.org/officeDocument/2006/relationships" xmlns:p="http://schemas.openxmlformats.org/presentationml/2006/main">
   <p:cSld>
     <p:spTree>
@@ -6701,8 +9978,8 @@
         </p:nvSpPr>
         <p:spPr>
           <a:xfrm>
-            <a:off x="1164077" y="1899544"/>
-            <a:ext cx="10436211" cy="3970318"/>
+            <a:off x="1448169" y="1979437"/>
+            <a:ext cx="10436211" cy="3539430"/>
           </a:xfrm>
           <a:prstGeom prst="rect">
             <a:avLst/>
@@ -6716,7 +9993,7 @@
           <a:lstStyle/>
           <a:p>
             <a:r>
-              <a:rPr lang="en-US" sz="3600" dirty="0">
+              <a:rPr lang="en-US" sz="3200" b="1" dirty="0">
                 <a:solidFill>
                   <a:schemeClr val="bg1">
                     <a:lumMod val="75000"/>
@@ -6725,10 +10002,10 @@
                 </a:solidFill>
                 <a:latin typeface="Questrial" panose="02000000000000000000"/>
               </a:rPr>
-              <a:t>construct an accurate snapshot of NYC neighborhoods</a:t>
-            </a:r>
-            <a:r>
-              <a:rPr lang="en-US" sz="3600" b="1" dirty="0">
+              <a:t>construct</a:t>
+            </a:r>
+            <a:r>
+              <a:rPr lang="en-US" sz="3200" dirty="0">
                 <a:solidFill>
                   <a:schemeClr val="bg1">
                     <a:lumMod val="75000"/>
@@ -6737,11 +10014,23 @@
                 </a:solidFill>
                 <a:latin typeface="Questrial" panose="02000000000000000000"/>
               </a:rPr>
+              <a:t> an accurate snapshot of NYC neighborhoods</a:t>
+            </a:r>
+            <a:r>
+              <a:rPr lang="en-US" sz="3200" b="1" dirty="0">
+                <a:solidFill>
+                  <a:schemeClr val="bg1">
+                    <a:lumMod val="75000"/>
+                    <a:lumOff val="25000"/>
+                  </a:schemeClr>
+                </a:solidFill>
+                <a:latin typeface="Questrial" panose="02000000000000000000"/>
+              </a:rPr>
               <a:t>			</a:t>
             </a:r>
           </a:p>
           <a:p>
-            <a:endParaRPr lang="en-US" sz="3600" b="1" dirty="0">
+            <a:endParaRPr lang="en-US" sz="3200" b="1" dirty="0">
               <a:solidFill>
                 <a:schemeClr val="bg1">
                   <a:lumMod val="75000"/>
@@ -6752,7 +10041,73 @@
             </a:endParaRPr>
           </a:p>
           <a:p>
-            <a:endParaRPr lang="en-US" sz="3600" b="1" dirty="0">
+            <a:r>
+              <a:rPr lang="en-US" sz="3200" b="1" dirty="0">
+                <a:solidFill>
+                  <a:schemeClr val="bg1">
+                    <a:lumMod val="75000"/>
+                    <a:lumOff val="25000"/>
+                  </a:schemeClr>
+                </a:solidFill>
+                <a:latin typeface="Questrial" panose="02000000000000000000"/>
+              </a:rPr>
+              <a:t>explore </a:t>
+            </a:r>
+            <a:r>
+              <a:rPr lang="en-US" sz="3200" dirty="0">
+                <a:solidFill>
+                  <a:schemeClr val="bg1">
+                    <a:lumMod val="75000"/>
+                    <a:lumOff val="25000"/>
+                  </a:schemeClr>
+                </a:solidFill>
+                <a:latin typeface="Questrial" panose="02000000000000000000"/>
+              </a:rPr>
+              <a:t>growth trends by neighborhood</a:t>
+            </a:r>
+          </a:p>
+          <a:p>
+            <a:r>
+              <a:rPr lang="en-US" sz="3200" b="1" dirty="0">
+                <a:solidFill>
+                  <a:schemeClr val="bg1">
+                    <a:lumMod val="75000"/>
+                    <a:lumOff val="25000"/>
+                  </a:schemeClr>
+                </a:solidFill>
+                <a:latin typeface="Questrial" panose="02000000000000000000"/>
+              </a:rPr>
+              <a:t>		</a:t>
+            </a:r>
+          </a:p>
+          <a:p>
+            <a:r>
+              <a:rPr lang="en-US" sz="3200" b="1" dirty="0">
+                <a:solidFill>
+                  <a:schemeClr val="bg1">
+                    <a:lumMod val="75000"/>
+                    <a:lumOff val="25000"/>
+                  </a:schemeClr>
+                </a:solidFill>
+                <a:latin typeface="Questrial" panose="02000000000000000000"/>
+              </a:rPr>
+              <a:t>develop </a:t>
+            </a:r>
+            <a:r>
+              <a:rPr lang="en-US" sz="3200" dirty="0">
+                <a:solidFill>
+                  <a:schemeClr val="bg1">
+                    <a:lumMod val="75000"/>
+                    <a:lumOff val="25000"/>
+                  </a:schemeClr>
+                </a:solidFill>
+                <a:latin typeface="Questrial" panose="02000000000000000000"/>
+              </a:rPr>
+              <a:t>a method to rank investment worthiness</a:t>
+            </a:r>
+          </a:p>
+          <a:p>
+            <a:endParaRPr lang="en-US" sz="3200" dirty="0">
               <a:solidFill>
                 <a:schemeClr val="bg1">
                   <a:lumMod val="75000"/>
@@ -6764,7 +10119,7 @@
           </a:p>
           <a:p>
             <a:r>
-              <a:rPr lang="en-US" sz="3600" b="1" dirty="0">
+              <a:rPr lang="en-US" sz="3200" b="1" dirty="0">
                 <a:solidFill>
                   <a:schemeClr val="bg1">
                     <a:lumMod val="75000"/>
@@ -6773,23 +10128,10 @@
                 </a:solidFill>
                 <a:latin typeface="Questrial" panose="02000000000000000000"/>
               </a:rPr>
-              <a:t>		</a:t>
-            </a:r>
-          </a:p>
-          <a:p>
-            <a:endParaRPr lang="en-US" sz="3600" b="1" dirty="0">
-              <a:solidFill>
-                <a:schemeClr val="bg1">
-                  <a:lumMod val="75000"/>
-                  <a:lumOff val="25000"/>
-                </a:schemeClr>
-              </a:solidFill>
-              <a:latin typeface="Questrial" panose="02000000000000000000"/>
-            </a:endParaRPr>
-          </a:p>
-          <a:p>
-            <a:r>
-              <a:rPr lang="en-US" sz="3600" b="1" dirty="0">
+              <a:t>evaluate</a:t>
+            </a:r>
+            <a:r>
+              <a:rPr lang="en-US" sz="3200" dirty="0">
                 <a:solidFill>
                   <a:schemeClr val="bg1">
                     <a:lumMod val="75000"/>
@@ -6798,7 +10140,7 @@
                 </a:solidFill>
                 <a:latin typeface="Questrial" panose="02000000000000000000"/>
               </a:rPr>
-              <a:t>develop</a:t>
+              <a:t> the effectiveness of each method</a:t>
             </a:r>
           </a:p>
         </p:txBody>
@@ -6840,59 +10182,6 @@
               <a:rPr lang="en-US" b="1" dirty="0"/>
               <a:t>Emmy</a:t>
             </a:r>
-          </a:p>
-        </p:txBody>
-      </p:sp>
-      <p:sp>
-        <p:nvSpPr>
-          <p:cNvPr id="9" name="TextBox 8">
-            <a:extLst>
-              <a:ext uri="{FF2B5EF4-FFF2-40B4-BE49-F238E27FC236}">
-                <a16:creationId xmlns:a16="http://schemas.microsoft.com/office/drawing/2014/main" id="{0367C30E-E95A-41B4-94CC-5DFCD3720928}"/>
-              </a:ext>
-            </a:extLst>
-          </p:cNvPr>
-          <p:cNvSpPr txBox="1"/>
-          <p:nvPr/>
-        </p:nvSpPr>
-        <p:spPr>
-          <a:xfrm>
-            <a:off x="7994059" y="309860"/>
-            <a:ext cx="3606229" cy="1477328"/>
-          </a:xfrm>
-          <a:prstGeom prst="rect">
-            <a:avLst/>
-          </a:prstGeom>
-          <a:noFill/>
-        </p:spPr>
-        <p:txBody>
-          <a:bodyPr wrap="square" rtlCol="0">
-            <a:spAutoFit/>
-          </a:bodyPr>
-          <a:lstStyle/>
-          <a:p>
-            <a:r>
-              <a:rPr lang="en-US" dirty="0"/>
-              <a:t>What is our model?</a:t>
-            </a:r>
-          </a:p>
-          <a:p>
-            <a:endParaRPr lang="en-US" dirty="0"/>
-          </a:p>
-          <a:p>
-            <a:r>
-              <a:rPr lang="en-US" dirty="0"/>
-              <a:t>Weighted</a:t>
-            </a:r>
-          </a:p>
-          <a:p>
-            <a:r>
-              <a:rPr lang="en-US" dirty="0"/>
-              <a:t>Ranking</a:t>
-            </a:r>
-          </a:p>
-          <a:p>
-            <a:endParaRPr lang="en-US" dirty="0"/>
           </a:p>
         </p:txBody>
       </p:sp>
@@ -7019,7 +10308,7 @@
         </p:nvSpPr>
         <p:spPr>
           <a:xfrm>
-            <a:off x="3350726" y="1902194"/>
+            <a:off x="3350726" y="1680253"/>
             <a:ext cx="7112996" cy="3970318"/>
           </a:xfrm>
           <a:prstGeom prst="rect">
@@ -7134,7 +10423,7 @@
         </p:nvSpPr>
         <p:spPr>
           <a:xfrm>
-            <a:off x="1164077" y="1899544"/>
+            <a:off x="1164077" y="1695359"/>
             <a:ext cx="1781655" cy="3970318"/>
           </a:xfrm>
           <a:prstGeom prst="rect">
@@ -7257,7 +10546,9 @@
               </a:ext>
             </a:extLst>
           </p:cNvPr>
-          <p:cNvCxnSpPr/>
+          <p:cNvCxnSpPr>
+            <a:cxnSpLocks/>
+          </p:cNvCxnSpPr>
           <p:nvPr/>
         </p:nvCxnSpPr>
         <p:spPr>
@@ -7329,6 +10620,119 @@
           </a:p>
         </p:txBody>
       </p:sp>
+      <p:sp>
+        <p:nvSpPr>
+          <p:cNvPr id="9" name="TextBox 8">
+            <a:extLst>
+              <a:ext uri="{FF2B5EF4-FFF2-40B4-BE49-F238E27FC236}">
+                <a16:creationId xmlns:a16="http://schemas.microsoft.com/office/drawing/2014/main" id="{26C4E1B6-E2BC-45AF-A6AA-1BD227A1865A}"/>
+              </a:ext>
+            </a:extLst>
+          </p:cNvPr>
+          <p:cNvSpPr txBox="1"/>
+          <p:nvPr/>
+        </p:nvSpPr>
+        <p:spPr>
+          <a:xfrm>
+            <a:off x="3508118" y="2202121"/>
+            <a:ext cx="4490336" cy="4247317"/>
+          </a:xfrm>
+          <a:prstGeom prst="rect">
+            <a:avLst/>
+          </a:prstGeom>
+          <a:noFill/>
+        </p:spPr>
+        <p:txBody>
+          <a:bodyPr wrap="square" rtlCol="0">
+            <a:spAutoFit/>
+          </a:bodyPr>
+          <a:lstStyle/>
+          <a:p>
+            <a:r>
+              <a:rPr lang="en-US" sz="5400" dirty="0">
+                <a:solidFill>
+                  <a:srgbClr val="FFC000"/>
+                </a:solidFill>
+                <a:effectLst>
+                  <a:outerShdw blurRad="38100" dist="38100" dir="2700000" algn="tl">
+                    <a:srgbClr val="000000">
+                      <a:alpha val="43137"/>
+                    </a:srgbClr>
+                  </a:outerShdw>
+                </a:effectLst>
+                <a:latin typeface="Britannic Bold" panose="020B0903060703020204" pitchFamily="34" charset="0"/>
+              </a:rPr>
+              <a:t>IRS   	 NYPD</a:t>
+            </a:r>
+          </a:p>
+          <a:p>
+            <a:endParaRPr lang="en-US" sz="5400" dirty="0">
+              <a:solidFill>
+                <a:srgbClr val="FFC000"/>
+              </a:solidFill>
+              <a:effectLst>
+                <a:outerShdw blurRad="38100" dist="38100" dir="2700000" algn="tl">
+                  <a:srgbClr val="000000">
+                    <a:alpha val="43137"/>
+                  </a:srgbClr>
+                </a:outerShdw>
+              </a:effectLst>
+              <a:latin typeface="Britannic Bold" panose="020B0903060703020204" pitchFamily="34" charset="0"/>
+            </a:endParaRPr>
+          </a:p>
+          <a:p>
+            <a:r>
+              <a:rPr lang="en-US" sz="5400" dirty="0">
+                <a:solidFill>
+                  <a:srgbClr val="FFC000"/>
+                </a:solidFill>
+                <a:effectLst>
+                  <a:outerShdw blurRad="38100" dist="38100" dir="2700000" algn="tl">
+                    <a:srgbClr val="000000">
+                      <a:alpha val="43137"/>
+                    </a:srgbClr>
+                  </a:outerShdw>
+                </a:effectLst>
+                <a:latin typeface="Britannic Bold" panose="020B0903060703020204" pitchFamily="34" charset="0"/>
+              </a:rPr>
+              <a:t>DOF		 DOB</a:t>
+            </a:r>
+          </a:p>
+          <a:p>
+            <a:endParaRPr lang="en-US" sz="5400" dirty="0">
+              <a:solidFill>
+                <a:srgbClr val="FFC000"/>
+              </a:solidFill>
+              <a:effectLst>
+                <a:outerShdw blurRad="38100" dist="38100" dir="2700000" algn="tl">
+                  <a:srgbClr val="000000">
+                    <a:alpha val="43137"/>
+                  </a:srgbClr>
+                </a:outerShdw>
+              </a:effectLst>
+              <a:latin typeface="Britannic Bold" panose="020B0903060703020204" pitchFamily="34" charset="0"/>
+            </a:endParaRPr>
+          </a:p>
+          <a:p>
+            <a:r>
+              <a:rPr lang="en-US" sz="5400" dirty="0">
+                <a:solidFill>
+                  <a:srgbClr val="FFC000"/>
+                </a:solidFill>
+                <a:effectLst>
+                  <a:outerShdw blurRad="38100" dist="38100" dir="2700000" algn="tl">
+                    <a:srgbClr val="000000">
+                      <a:alpha val="43137"/>
+                    </a:srgbClr>
+                  </a:outerShdw>
+                </a:effectLst>
+                <a:latin typeface="Britannic Bold" panose="020B0903060703020204" pitchFamily="34" charset="0"/>
+              </a:rPr>
+              <a:t>NY ESD</a:t>
+            </a:r>
+          </a:p>
+        </p:txBody>
+      </p:sp>
     </p:spTree>
     <p:extLst>
       <p:ext uri="{BB962C8B-B14F-4D97-AF65-F5344CB8AC3E}">
@@ -7339,6 +10743,92 @@
   <p:clrMapOvr>
     <a:masterClrMapping/>
   </p:clrMapOvr>
+  <p:timing>
+    <p:tnLst>
+      <p:par>
+        <p:cTn id="1" dur="indefinite" restart="never" nodeType="tmRoot">
+          <p:childTnLst>
+            <p:seq concurrent="1" nextAc="seek">
+              <p:cTn id="2" dur="indefinite" nodeType="mainSeq">
+                <p:childTnLst>
+                  <p:par>
+                    <p:cTn id="3" fill="hold">
+                      <p:stCondLst>
+                        <p:cond delay="indefinite"/>
+                      </p:stCondLst>
+                      <p:childTnLst>
+                        <p:par>
+                          <p:cTn id="4" fill="hold">
+                            <p:stCondLst>
+                              <p:cond delay="0"/>
+                            </p:stCondLst>
+                            <p:childTnLst>
+                              <p:par>
+                                <p:cTn id="5" presetID="10" presetClass="entr" presetSubtype="0" fill="hold" grpId="0" nodeType="clickEffect">
+                                  <p:stCondLst>
+                                    <p:cond delay="0"/>
+                                  </p:stCondLst>
+                                  <p:childTnLst>
+                                    <p:set>
+                                      <p:cBhvr>
+                                        <p:cTn id="6" dur="1" fill="hold">
+                                          <p:stCondLst>
+                                            <p:cond delay="0"/>
+                                          </p:stCondLst>
+                                        </p:cTn>
+                                        <p:tgtEl>
+                                          <p:spTgt spid="9"/>
+                                        </p:tgtEl>
+                                        <p:attrNameLst>
+                                          <p:attrName>style.visibility</p:attrName>
+                                        </p:attrNameLst>
+                                      </p:cBhvr>
+                                      <p:to>
+                                        <p:strVal val="visible"/>
+                                      </p:to>
+                                    </p:set>
+                                    <p:animEffect transition="in" filter="fade">
+                                      <p:cBhvr>
+                                        <p:cTn id="7" dur="500"/>
+                                        <p:tgtEl>
+                                          <p:spTgt spid="9"/>
+                                        </p:tgtEl>
+                                      </p:cBhvr>
+                                    </p:animEffect>
+                                  </p:childTnLst>
+                                </p:cTn>
+                              </p:par>
+                            </p:childTnLst>
+                          </p:cTn>
+                        </p:par>
+                      </p:childTnLst>
+                    </p:cTn>
+                  </p:par>
+                </p:childTnLst>
+              </p:cTn>
+              <p:prevCondLst>
+                <p:cond evt="onPrev" delay="0">
+                  <p:tgtEl>
+                    <p:sldTgt/>
+                  </p:tgtEl>
+                </p:cond>
+              </p:prevCondLst>
+              <p:nextCondLst>
+                <p:cond evt="onNext" delay="0">
+                  <p:tgtEl>
+                    <p:sldTgt/>
+                  </p:tgtEl>
+                </p:cond>
+              </p:nextCondLst>
+            </p:seq>
+          </p:childTnLst>
+        </p:cTn>
+      </p:par>
+    </p:tnLst>
+    <p:bldLst>
+      <p:bldP spid="9" grpId="0"/>
+    </p:bldLst>
+  </p:timing>
 </p:sld>
 </file>
 
@@ -7656,6 +11146,32 @@
 <file path=ppt/slides/slide7.xml><?xml version="1.0" encoding="utf-8"?>
 <p:sld xmlns:a="http://schemas.openxmlformats.org/drawingml/2006/main" xmlns:r="http://schemas.openxmlformats.org/officeDocument/2006/relationships" xmlns:p="http://schemas.openxmlformats.org/presentationml/2006/main">
   <p:cSld>
+    <p:bg>
+      <p:bgPr>
+        <a:gradFill flip="none" rotWithShape="1">
+          <a:gsLst>
+            <a:gs pos="23448">
+              <a:schemeClr val="tx1">
+                <a:lumMod val="85000"/>
+              </a:schemeClr>
+            </a:gs>
+            <a:gs pos="83000">
+              <a:schemeClr val="tx1">
+                <a:lumMod val="65000"/>
+              </a:schemeClr>
+            </a:gs>
+            <a:gs pos="100000">
+              <a:schemeClr val="bg2">
+                <a:lumMod val="50000"/>
+              </a:schemeClr>
+            </a:gs>
+          </a:gsLst>
+          <a:lin ang="4740000" scaled="1"/>
+          <a:tileRect/>
+        </a:gradFill>
+        <a:effectLst/>
+      </p:bgPr>
+    </p:bg>
     <p:spTree>
       <p:nvGrpSpPr>
         <p:cNvPr id="1" name=""/>
@@ -7672,10 +11188,10 @@
       </p:grpSpPr>
       <p:sp>
         <p:nvSpPr>
-          <p:cNvPr id="3" name="TextBox 2">
+          <p:cNvPr id="8" name="TextBox 7">
             <a:extLst>
               <a:ext uri="{FF2B5EF4-FFF2-40B4-BE49-F238E27FC236}">
-                <a16:creationId xmlns:a16="http://schemas.microsoft.com/office/drawing/2014/main" id="{E03A1BD5-672E-374E-9E30-401EB3C688D1}"/>
+                <a16:creationId xmlns:a16="http://schemas.microsoft.com/office/drawing/2014/main" id="{46C0A125-FF4F-6C43-B8AE-3C5B715290A5}"/>
               </a:ext>
             </a:extLst>
           </p:cNvPr>
@@ -7684,8 +11200,8 @@
         </p:nvSpPr>
         <p:spPr>
           <a:xfrm>
-            <a:off x="1058238" y="678094"/>
-            <a:ext cx="3606229" cy="1477328"/>
+            <a:off x="823598" y="520095"/>
+            <a:ext cx="6015530" cy="1015663"/>
           </a:xfrm>
           <a:prstGeom prst="rect">
             <a:avLst/>
@@ -7699,36 +11215,47 @@
           <a:lstStyle/>
           <a:p>
             <a:r>
-              <a:rPr lang="en-US" dirty="0"/>
-              <a:t>Data Clean Up</a:t>
-            </a:r>
-          </a:p>
-          <a:p>
-            <a:endParaRPr lang="en-US" dirty="0"/>
-          </a:p>
-          <a:p>
-            <a:r>
-              <a:rPr lang="en-US" dirty="0"/>
-              <a:t>Before and After </a:t>
-            </a:r>
-          </a:p>
-          <a:p>
-            <a:endParaRPr lang="en-US" dirty="0"/>
-          </a:p>
-          <a:p>
-            <a:r>
-              <a:rPr lang="en-US" dirty="0"/>
-              <a:t>Tell the transformation story</a:t>
-            </a:r>
-          </a:p>
-        </p:txBody>
-      </p:sp>
-      <p:sp>
-        <p:nvSpPr>
-          <p:cNvPr id="5" name="TextBox 4">
+              <a:rPr lang="en-US" sz="6000" dirty="0">
+                <a:solidFill>
+                  <a:schemeClr val="bg2">
+                    <a:lumMod val="75000"/>
+                  </a:schemeClr>
+                </a:solidFill>
+                <a:latin typeface="Questrial" panose="02000000000000000000" pitchFamily="2" charset="0"/>
+              </a:rPr>
+              <a:t>our</a:t>
+            </a:r>
+            <a:r>
+              <a:rPr lang="en-US" sz="6000" b="1" dirty="0">
+                <a:solidFill>
+                  <a:schemeClr val="bg2">
+                    <a:lumMod val="75000"/>
+                  </a:schemeClr>
+                </a:solidFill>
+                <a:latin typeface="Questrial" panose="02000000000000000000" pitchFamily="2" charset="0"/>
+              </a:rPr>
+              <a:t> data </a:t>
+            </a:r>
+            <a:r>
+              <a:rPr lang="en-US" sz="6000" dirty="0">
+                <a:solidFill>
+                  <a:schemeClr val="bg2">
+                    <a:lumMod val="75000"/>
+                  </a:schemeClr>
+                </a:solidFill>
+                <a:latin typeface="Questrial" panose="02000000000000000000" pitchFamily="2" charset="0"/>
+              </a:rPr>
+              <a:t>-&gt; sales</a:t>
+            </a:r>
+          </a:p>
+        </p:txBody>
+      </p:sp>
+      <p:sp>
+        <p:nvSpPr>
+          <p:cNvPr id="7" name="TextBox 6">
             <a:extLst>
               <a:ext uri="{FF2B5EF4-FFF2-40B4-BE49-F238E27FC236}">
-                <a16:creationId xmlns:a16="http://schemas.microsoft.com/office/drawing/2014/main" id="{BBEC2DEF-2EEE-D742-A623-0967BCEDC039}"/>
+                <a16:creationId xmlns:a16="http://schemas.microsoft.com/office/drawing/2014/main" id="{63B711B5-FE9C-41C1-9BEF-FD36F6ED18FE}"/>
               </a:ext>
             </a:extLst>
           </p:cNvPr>
@@ -7738,7 +11265,7 @@
         <p:spPr>
           <a:xfrm>
             <a:off x="10602098" y="98854"/>
-            <a:ext cx="1309816" cy="923330"/>
+            <a:ext cx="1309816" cy="369332"/>
           </a:xfrm>
           <a:prstGeom prst="rect">
             <a:avLst/>
@@ -7758,15 +11285,43 @@
             <a:pPr algn="ctr"/>
             <a:r>
               <a:rPr lang="en-US" b="1" dirty="0"/>
-              <a:t>Sales and Dev - Emmy</a:t>
-            </a:r>
-          </a:p>
-        </p:txBody>
-      </p:sp>
+              <a:t>Emmy</a:t>
+            </a:r>
+          </a:p>
+        </p:txBody>
+      </p:sp>
+      <p:graphicFrame>
+        <p:nvGraphicFramePr>
+          <p:cNvPr id="17" name="Diagram 16">
+            <a:extLst>
+              <a:ext uri="{FF2B5EF4-FFF2-40B4-BE49-F238E27FC236}">
+                <a16:creationId xmlns:a16="http://schemas.microsoft.com/office/drawing/2014/main" id="{880232BC-DB29-4321-BCFA-535900F01275}"/>
+              </a:ext>
+            </a:extLst>
+          </p:cNvPr>
+          <p:cNvGraphicFramePr/>
+          <p:nvPr>
+            <p:extLst>
+              <p:ext uri="{D42A27DB-BD31-4B8C-83A1-F6EECF244321}">
+                <p14:modId xmlns:p14="http://schemas.microsoft.com/office/powerpoint/2010/main" val="290880253"/>
+              </p:ext>
+            </p:extLst>
+          </p:nvPr>
+        </p:nvGraphicFramePr>
+        <p:xfrm>
+          <a:off x="557267" y="1686757"/>
+          <a:ext cx="11036969" cy="4806379"/>
+        </p:xfrm>
+        <a:graphic>
+          <a:graphicData uri="http://schemas.openxmlformats.org/drawingml/2006/diagram">
+            <dgm:relIds xmlns:dgm="http://schemas.openxmlformats.org/drawingml/2006/diagram" xmlns:r="http://schemas.openxmlformats.org/officeDocument/2006/relationships" r:dm="rId2" r:lo="rId3" r:qs="rId4" r:cs="rId5"/>
+          </a:graphicData>
+        </a:graphic>
+      </p:graphicFrame>
     </p:spTree>
     <p:extLst>
       <p:ext uri="{BB962C8B-B14F-4D97-AF65-F5344CB8AC3E}">
-        <p14:creationId xmlns:p14="http://schemas.microsoft.com/office/powerpoint/2010/main" val="700342363"/>
+        <p14:creationId xmlns:p14="http://schemas.microsoft.com/office/powerpoint/2010/main" val="1398655382"/>
       </p:ext>
     </p:extLst>
   </p:cSld>
@@ -7851,7 +11406,7 @@
           <p:cNvPr id="5" name="TextBox 4">
             <a:extLst>
               <a:ext uri="{FF2B5EF4-FFF2-40B4-BE49-F238E27FC236}">
-                <a16:creationId xmlns:a16="http://schemas.microsoft.com/office/drawing/2014/main" id="{574CD34D-8741-534E-94A4-835DFAFB26BD}"/>
+                <a16:creationId xmlns:a16="http://schemas.microsoft.com/office/drawing/2014/main" id="{BBEC2DEF-2EEE-D742-A623-0967BCEDC039}"/>
               </a:ext>
             </a:extLst>
           </p:cNvPr>
@@ -7861,7 +11416,7 @@
         <p:spPr>
           <a:xfrm>
             <a:off x="10602098" y="98854"/>
-            <a:ext cx="1309816" cy="369332"/>
+            <a:ext cx="1309816" cy="923330"/>
           </a:xfrm>
           <a:prstGeom prst="rect">
             <a:avLst/>
@@ -7881,7 +11436,7 @@
             <a:pPr algn="ctr"/>
             <a:r>
               <a:rPr lang="en-US" b="1" dirty="0"/>
-              <a:t>JC - Income</a:t>
+              <a:t>Sales and Dev - Emmy</a:t>
             </a:r>
           </a:p>
         </p:txBody>
@@ -7889,7 +11444,7 @@
     </p:spTree>
     <p:extLst>
       <p:ext uri="{BB962C8B-B14F-4D97-AF65-F5344CB8AC3E}">
-        <p14:creationId xmlns:p14="http://schemas.microsoft.com/office/powerpoint/2010/main" val="3882611632"/>
+        <p14:creationId xmlns:p14="http://schemas.microsoft.com/office/powerpoint/2010/main" val="700342363"/>
       </p:ext>
     </p:extLst>
   </p:cSld>
@@ -7931,7 +11486,7 @@
         <p:spPr>
           <a:xfrm>
             <a:off x="1058238" y="678094"/>
-            <a:ext cx="3606229" cy="369332"/>
+            <a:ext cx="3606229" cy="1477328"/>
           </a:xfrm>
           <a:prstGeom prst="rect">
             <a:avLst/>
@@ -7946,17 +11501,35 @@
           <a:p>
             <a:r>
               <a:rPr lang="en-US" dirty="0"/>
-              <a:t>Coding for Model</a:t>
-            </a:r>
-          </a:p>
-        </p:txBody>
-      </p:sp>
-      <p:sp>
-        <p:nvSpPr>
-          <p:cNvPr id="4" name="TextBox 3">
+              <a:t>Data Clean Up</a:t>
+            </a:r>
+          </a:p>
+          <a:p>
+            <a:endParaRPr lang="en-US" dirty="0"/>
+          </a:p>
+          <a:p>
+            <a:r>
+              <a:rPr lang="en-US" dirty="0"/>
+              <a:t>Before and After </a:t>
+            </a:r>
+          </a:p>
+          <a:p>
+            <a:endParaRPr lang="en-US" dirty="0"/>
+          </a:p>
+          <a:p>
+            <a:r>
+              <a:rPr lang="en-US" dirty="0"/>
+              <a:t>Tell the transformation story</a:t>
+            </a:r>
+          </a:p>
+        </p:txBody>
+      </p:sp>
+      <p:sp>
+        <p:nvSpPr>
+          <p:cNvPr id="5" name="TextBox 4">
             <a:extLst>
               <a:ext uri="{FF2B5EF4-FFF2-40B4-BE49-F238E27FC236}">
-                <a16:creationId xmlns:a16="http://schemas.microsoft.com/office/drawing/2014/main" id="{7D71584C-C8FB-FE4F-AC8F-7C28ED2B2892}"/>
+                <a16:creationId xmlns:a16="http://schemas.microsoft.com/office/drawing/2014/main" id="{574CD34D-8741-534E-94A4-835DFAFB26BD}"/>
               </a:ext>
             </a:extLst>
           </p:cNvPr>
@@ -7986,7 +11559,7 @@
             <a:pPr algn="ctr"/>
             <a:r>
               <a:rPr lang="en-US" b="1" dirty="0"/>
-              <a:t>???</a:t>
+              <a:t>JC - Income</a:t>
             </a:r>
           </a:p>
         </p:txBody>
@@ -7994,7 +11567,7 @@
     </p:spTree>
     <p:extLst>
       <p:ext uri="{BB962C8B-B14F-4D97-AF65-F5344CB8AC3E}">
-        <p14:creationId xmlns:p14="http://schemas.microsoft.com/office/powerpoint/2010/main" val="2020585456"/>
+        <p14:creationId xmlns:p14="http://schemas.microsoft.com/office/powerpoint/2010/main" val="3882611632"/>
       </p:ext>
     </p:extLst>
   </p:cSld>

</xml_diff>